<commit_message>
make it use the correct output
</commit_message>
<xml_diff>
--- a/presentation/meetup.pptx
+++ b/presentation/meetup.pptx
@@ -5,10 +5,10 @@
     <p:sldMasterId id="2147483648" r:id="rId1"/>
   </p:sldMasterIdLst>
   <p:notesMasterIdLst>
-    <p:notesMasterId r:id="rId32"/>
+    <p:notesMasterId r:id="rId31"/>
   </p:notesMasterIdLst>
   <p:handoutMasterIdLst>
-    <p:handoutMasterId r:id="rId33"/>
+    <p:handoutMasterId r:id="rId32"/>
   </p:handoutMasterIdLst>
   <p:sldIdLst>
     <p:sldId id="349" r:id="rId2"/>
@@ -28,19 +28,18 @@
     <p:sldId id="373" r:id="rId16"/>
     <p:sldId id="374" r:id="rId17"/>
     <p:sldId id="375" r:id="rId18"/>
-    <p:sldId id="376" r:id="rId19"/>
-    <p:sldId id="377" r:id="rId20"/>
-    <p:sldId id="378" r:id="rId21"/>
-    <p:sldId id="379" r:id="rId22"/>
-    <p:sldId id="380" r:id="rId23"/>
-    <p:sldId id="381" r:id="rId24"/>
-    <p:sldId id="382" r:id="rId25"/>
-    <p:sldId id="383" r:id="rId26"/>
-    <p:sldId id="384" r:id="rId27"/>
-    <p:sldId id="385" r:id="rId28"/>
-    <p:sldId id="386" r:id="rId29"/>
-    <p:sldId id="387" r:id="rId30"/>
-    <p:sldId id="388" r:id="rId31"/>
+    <p:sldId id="377" r:id="rId19"/>
+    <p:sldId id="378" r:id="rId20"/>
+    <p:sldId id="379" r:id="rId21"/>
+    <p:sldId id="380" r:id="rId22"/>
+    <p:sldId id="381" r:id="rId23"/>
+    <p:sldId id="382" r:id="rId24"/>
+    <p:sldId id="383" r:id="rId25"/>
+    <p:sldId id="384" r:id="rId26"/>
+    <p:sldId id="385" r:id="rId27"/>
+    <p:sldId id="386" r:id="rId28"/>
+    <p:sldId id="387" r:id="rId29"/>
+    <p:sldId id="388" r:id="rId30"/>
   </p:sldIdLst>
   <p:sldSz cx="12192000" cy="6858000"/>
   <p:notesSz cx="9144000" cy="6858000"/>
@@ -150,6 +149,57 @@
 </p:presentation>
 </file>
 
+<file path=ppt/changesInfos/changesInfo1.xml><?xml version="1.0" encoding="utf-8"?>
+<pc:chgInfo xmlns:a="http://schemas.openxmlformats.org/drawingml/2006/main" xmlns:r="http://schemas.openxmlformats.org/officeDocument/2006/relationships" xmlns:ac="http://schemas.microsoft.com/office/drawing/2013/main/command" xmlns:pc="http://schemas.microsoft.com/office/powerpoint/2013/main/command">
+  <pc:docChgLst>
+    <pc:chgData clId="Web-{CB74432A-EBEE-41FD-97F5-0966D10D001A}"/>
+    <pc:docChg chg="delSld modSld">
+      <pc:chgData name="" userId="" providerId="" clId="Web-{CB74432A-EBEE-41FD-97F5-0966D10D001A}" dt="2018-04-11T18:44:47.965" v="51"/>
+      <pc:docMkLst>
+        <pc:docMk/>
+      </pc:docMkLst>
+      <pc:sldChg chg="modSp">
+        <pc:chgData name="" userId="" providerId="" clId="Web-{CB74432A-EBEE-41FD-97F5-0966D10D001A}" dt="2018-04-11T18:41:42.824" v="10"/>
+        <pc:sldMkLst>
+          <pc:docMk/>
+          <pc:sldMk cId="2237707165" sldId="374"/>
+        </pc:sldMkLst>
+        <pc:spChg chg="mod">
+          <ac:chgData name="" userId="" providerId="" clId="Web-{CB74432A-EBEE-41FD-97F5-0966D10D001A}" dt="2018-04-11T18:41:42.824" v="10"/>
+          <ac:spMkLst>
+            <pc:docMk/>
+            <pc:sldMk cId="2237707165" sldId="374"/>
+            <ac:spMk id="3" creationId="{00000000-0000-0000-0000-000000000000}"/>
+          </ac:spMkLst>
+        </pc:spChg>
+      </pc:sldChg>
+      <pc:sldChg chg="del">
+        <pc:chgData name="" userId="" providerId="" clId="Web-{CB74432A-EBEE-41FD-97F5-0966D10D001A}" dt="2018-04-11T18:41:46.199" v="12"/>
+        <pc:sldMkLst>
+          <pc:docMk/>
+          <pc:sldMk cId="1218579122" sldId="376"/>
+        </pc:sldMkLst>
+      </pc:sldChg>
+      <pc:sldChg chg="modSp modNotes">
+        <pc:chgData name="" userId="" providerId="" clId="Web-{CB74432A-EBEE-41FD-97F5-0966D10D001A}" dt="2018-04-11T18:44:47.965" v="51"/>
+        <pc:sldMkLst>
+          <pc:docMk/>
+          <pc:sldMk cId="3934580896" sldId="377"/>
+        </pc:sldMkLst>
+        <pc:spChg chg="mod">
+          <ac:chgData name="" userId="" providerId="" clId="Web-{CB74432A-EBEE-41FD-97F5-0966D10D001A}" dt="2018-04-11T18:42:55.465" v="17"/>
+          <ac:spMkLst>
+            <pc:docMk/>
+            <pc:sldMk cId="3934580896" sldId="377"/>
+            <ac:spMk id="3" creationId="{00000000-0000-0000-0000-000000000000}"/>
+          </ac:spMkLst>
+        </pc:spChg>
+      </pc:sldChg>
+    </pc:docChg>
+  </pc:docChgLst>
+</pc:chgInfo>
+</file>
+
 <file path=ppt/handoutMasters/handoutMaster1.xml><?xml version="1.0" encoding="utf-8"?>
 <p:handoutMaster xmlns:a="http://schemas.openxmlformats.org/drawingml/2006/main" xmlns:r="http://schemas.openxmlformats.org/officeDocument/2006/relationships" xmlns:p="http://schemas.openxmlformats.org/presentationml/2006/main">
   <p:cSld>
@@ -177,7 +227,7 @@
           <p:cNvPr id="2" name="Header Placeholder 1">
             <a:extLst>
               <a:ext uri="{FF2B5EF4-FFF2-40B4-BE49-F238E27FC236}">
-                <a16:creationId xmlns="" xmlns:a16="http://schemas.microsoft.com/office/drawing/2014/main" id="{2F57A95B-4E9C-B34A-A9E3-88BD4A16F330}"/>
+                <a16:creationId xmlns:a16="http://schemas.microsoft.com/office/drawing/2014/main" id="{2F57A95B-4E9C-B34A-A9E3-88BD4A16F330}"/>
               </a:ext>
             </a:extLst>
           </p:cNvPr>
@@ -214,7 +264,7 @@
           <p:cNvPr id="3" name="Date Placeholder 2">
             <a:extLst>
               <a:ext uri="{FF2B5EF4-FFF2-40B4-BE49-F238E27FC236}">
-                <a16:creationId xmlns="" xmlns:a16="http://schemas.microsoft.com/office/drawing/2014/main" id="{DB862440-B0C7-BF4D-94E1-661503A2D9A3}"/>
+                <a16:creationId xmlns:a16="http://schemas.microsoft.com/office/drawing/2014/main" id="{DB862440-B0C7-BF4D-94E1-661503A2D9A3}"/>
               </a:ext>
             </a:extLst>
           </p:cNvPr>
@@ -244,7 +294,7 @@
           <a:p>
             <a:fld id="{1896C5F1-DFC7-F145-B4AD-03FC2D991F8F}" type="datetimeFigureOut">
               <a:rPr lang="en-US" smtClean="0"/>
-              <a:t>3/28/18</a:t>
+              <a:t>4/11/2018</a:t>
             </a:fld>
             <a:endParaRPr lang="en-US"/>
           </a:p>
@@ -255,7 +305,7 @@
           <p:cNvPr id="4" name="Footer Placeholder 3">
             <a:extLst>
               <a:ext uri="{FF2B5EF4-FFF2-40B4-BE49-F238E27FC236}">
-                <a16:creationId xmlns="" xmlns:a16="http://schemas.microsoft.com/office/drawing/2014/main" id="{D32F6D43-76DC-0A4E-B62A-27EB4C664C0A}"/>
+                <a16:creationId xmlns:a16="http://schemas.microsoft.com/office/drawing/2014/main" id="{D32F6D43-76DC-0A4E-B62A-27EB4C664C0A}"/>
               </a:ext>
             </a:extLst>
           </p:cNvPr>
@@ -292,7 +342,7 @@
           <p:cNvPr id="5" name="Slide Number Placeholder 4">
             <a:extLst>
               <a:ext uri="{FF2B5EF4-FFF2-40B4-BE49-F238E27FC236}">
-                <a16:creationId xmlns="" xmlns:a16="http://schemas.microsoft.com/office/drawing/2014/main" id="{2F652BC0-A858-814A-B7F5-8DA76469EDAF}"/>
+                <a16:creationId xmlns:a16="http://schemas.microsoft.com/office/drawing/2014/main" id="{2F652BC0-A858-814A-B7F5-8DA76469EDAF}"/>
               </a:ext>
             </a:extLst>
           </p:cNvPr>
@@ -421,7 +471,7 @@
           <a:p>
             <a:fld id="{464BA5E9-42AC-FB44-A01A-932FDCCD8508}" type="datetimeFigureOut">
               <a:rPr lang="en-US" smtClean="0"/>
-              <a:t>3/28/18</a:t>
+              <a:t>4/11/2018</a:t>
             </a:fld>
             <a:endParaRPr lang="en-US"/>
           </a:p>
@@ -1390,12 +1440,6 @@
           </a:p>
           <a:p>
             <a:pPr rtl="0"/>
-            <a:r>
-              <a:rPr lang="en-US" b="0" dirty="0">
-                <a:effectLst/>
-              </a:rPr>
-              <a:t/>
-            </a:r>
             <a:br>
               <a:rPr lang="en-US" b="0" dirty="0">
                 <a:effectLst/>
@@ -1418,10 +1462,6 @@
             </a:endParaRPr>
           </a:p>
           <a:p>
-            <a:r>
-              <a:rPr lang="en-US" dirty="0"/>
-              <a:t/>
-            </a:r>
             <a:br>
               <a:rPr lang="en-US" dirty="0"/>
             </a:br>
@@ -1510,35 +1550,35 @@
           <a:lstStyle/>
           <a:p>
             <a:r>
-              <a:rPr lang="en-US" dirty="0" smtClean="0"/>
+              <a:rPr lang="en-US" dirty="0"/>
               <a:t>This is an example of the consistent</a:t>
             </a:r>
             <a:r>
-              <a:rPr lang="en-US" baseline="0" dirty="0" smtClean="0"/>
+              <a:rPr lang="en-US" baseline="0" dirty="0"/>
               <a:t> UI that </a:t>
             </a:r>
             <a:r>
-              <a:rPr lang="en-US" baseline="0" dirty="0" err="1" smtClean="0"/>
+              <a:rPr lang="en-US" baseline="0" dirty="0" err="1"/>
               <a:t>kubernetes</a:t>
             </a:r>
             <a:r>
-              <a:rPr lang="en-US" baseline="0" dirty="0" smtClean="0"/>
+              <a:rPr lang="en-US" baseline="0" dirty="0"/>
               <a:t> has at it’s base of CRUD operations with </a:t>
             </a:r>
             <a:r>
-              <a:rPr lang="en-US" baseline="0" dirty="0" err="1" smtClean="0"/>
+              <a:rPr lang="en-US" baseline="0" dirty="0" err="1"/>
               <a:t>yaml</a:t>
             </a:r>
             <a:r>
-              <a:rPr lang="en-US" baseline="0" dirty="0" smtClean="0"/>
+              <a:rPr lang="en-US" baseline="0" dirty="0"/>
               <a:t>. This provides a consistent UI for machines to interact and have managed by automated processes, which are </a:t>
             </a:r>
             <a:r>
-              <a:rPr lang="en-US" baseline="0" dirty="0" err="1" smtClean="0"/>
+              <a:rPr lang="en-US" baseline="0" dirty="0" err="1"/>
               <a:t>overlayed</a:t>
             </a:r>
             <a:r>
-              <a:rPr lang="en-US" baseline="0" dirty="0" smtClean="0"/>
+              <a:rPr lang="en-US" baseline="0" dirty="0"/>
               <a:t> by more complicated commands for a better UX.</a:t>
             </a:r>
           </a:p>
@@ -1625,10 +1665,9 @@
           <a:lstStyle/>
           <a:p>
             <a:r>
-              <a:rPr lang="en-US" dirty="0" smtClean="0"/>
+              <a:rPr lang="en-US" dirty="0"/>
               <a:t>Run through the animations here. Explain what is going on at each step.</a:t>
             </a:r>
-            <a:endParaRPr lang="en-US" dirty="0"/>
           </a:p>
         </p:txBody>
       </p:sp>
@@ -1802,11 +1841,11 @@
           <a:lstStyle/>
           <a:p>
             <a:r>
-              <a:rPr lang="en-US" dirty="0" smtClean="0"/>
+              <a:rPr lang="en-US" dirty="0"/>
               <a:t>Explanatory</a:t>
             </a:r>
             <a:r>
-              <a:rPr lang="en-US" baseline="0" dirty="0" smtClean="0"/>
+              <a:rPr lang="en-US" baseline="0" dirty="0"/>
               <a:t> for where the commands you are going to run come from. Not necessary for them to do. Point them at the guidance we have for doing this. Maybe bring it up in a browser.</a:t>
             </a:r>
             <a:endParaRPr lang="en-US" dirty="0"/>
@@ -1978,19 +2017,19 @@
           <a:lstStyle/>
           <a:p>
             <a:r>
-              <a:rPr lang="en-US" dirty="0" smtClean="0"/>
+              <a:rPr lang="en-US" dirty="0"/>
               <a:t>This makes sure</a:t>
             </a:r>
             <a:r>
-              <a:rPr lang="en-US" baseline="0" dirty="0" smtClean="0"/>
+              <a:rPr lang="en-US" baseline="0" dirty="0"/>
               <a:t> </a:t>
             </a:r>
             <a:r>
-              <a:rPr lang="en-US" baseline="0" dirty="0" err="1" smtClean="0"/>
+              <a:rPr lang="en-US" baseline="0" dirty="0" err="1"/>
               <a:t>docker</a:t>
             </a:r>
             <a:r>
-              <a:rPr lang="en-US" baseline="0" dirty="0" smtClean="0"/>
+              <a:rPr lang="en-US" baseline="0" dirty="0"/>
               <a:t> works</a:t>
             </a:r>
             <a:endParaRPr lang="en-US" dirty="0"/>
@@ -2078,8 +2117,10 @@
           <a:lstStyle/>
           <a:p>
             <a:r>
-              <a:rPr lang="en-US" dirty="0" smtClean="0"/>
-              <a:t>Explanation for the command we are about to show.</a:t>
+              <a:rPr lang="en-US" dirty="0">
+                <a:cs typeface="Calibri"/>
+              </a:rPr>
+              <a:t>Container orchestrators run containers. Containers are typically started from images.</a:t>
             </a:r>
             <a:endParaRPr lang="en-US" dirty="0"/>
           </a:p>
@@ -2102,7 +2143,7 @@
           <a:p>
             <a:fld id="{3D445AEF-66F2-8F4E-AF73-E138B1B3DC90}" type="slidenum">
               <a:rPr lang="en-US" smtClean="0"/>
-              <a:t>18</a:t>
+              <a:t>19</a:t>
             </a:fld>
             <a:endParaRPr lang="en-US"/>
           </a:p>
@@ -2111,7 +2152,7 @@
     </p:spTree>
     <p:extLst>
       <p:ext uri="{BB962C8B-B14F-4D97-AF65-F5344CB8AC3E}">
-        <p14:creationId xmlns:p14="http://schemas.microsoft.com/office/powerpoint/2010/main" val="799544701"/>
+        <p14:creationId xmlns:p14="http://schemas.microsoft.com/office/powerpoint/2010/main" val="1949916094"/>
       </p:ext>
     </p:extLst>
   </p:cSld>
@@ -2165,7 +2206,97 @@
           <a:bodyPr/>
           <a:lstStyle/>
           <a:p>
+            <a:r>
+              <a:rPr lang="en-US" dirty="0"/>
+              <a:t>‘</a:t>
+            </a:r>
+            <a:r>
+              <a:rPr lang="en-US" dirty="0" err="1"/>
+              <a:t>kubectl</a:t>
+            </a:r>
+            <a:r>
+              <a:rPr lang="en-US" dirty="0"/>
+              <a:t> run’ is not something people would normally use. Most people CRUD </a:t>
+            </a:r>
+            <a:r>
+              <a:rPr lang="en-US" dirty="0" err="1"/>
+              <a:t>yaml</a:t>
+            </a:r>
+            <a:r>
+              <a:rPr lang="en-US" dirty="0"/>
+              <a:t>. For our purpose here, it’s a convenient shortcut.</a:t>
+            </a:r>
+          </a:p>
+          <a:p>
             <a:endParaRPr lang="en-US" dirty="0"/>
+          </a:p>
+          <a:p>
+            <a:r>
+              <a:rPr lang="en-US" dirty="0"/>
+              <a:t>The particular invocation of run will result in a deployment. Let’s look at the status of the deployment. </a:t>
+            </a:r>
+          </a:p>
+          <a:p>
+            <a:r>
+              <a:rPr lang="en-US" dirty="0"/>
+              <a:t>Let’s examine the columns. With the “DESIRED” column we can be immediately reminded of </a:t>
+            </a:r>
+            <a:r>
+              <a:rPr lang="en-US" dirty="0" err="1"/>
+              <a:t>kubernetes</a:t>
+            </a:r>
+            <a:r>
+              <a:rPr lang="en-US" dirty="0"/>
+              <a:t> desired state model. </a:t>
+            </a:r>
+          </a:p>
+          <a:p>
+            <a:r>
+              <a:rPr lang="en-US" dirty="0"/>
+              <a:t>If we run it quickly enough, we can see that the other columns are in </a:t>
+            </a:r>
+            <a:r>
+              <a:rPr lang="en-US" dirty="0" err="1"/>
+              <a:t>vearious</a:t>
+            </a:r>
+            <a:r>
+              <a:rPr lang="en-US" dirty="0"/>
+              <a:t> states of 1 or 0 as the container starts up and becomes reachable.</a:t>
+            </a:r>
+          </a:p>
+          <a:p>
+            <a:endParaRPr lang="en-US" dirty="0"/>
+          </a:p>
+          <a:p>
+            <a:r>
+              <a:rPr lang="en-US" dirty="0"/>
+              <a:t>What happened to all the pods we talked about earlier. Well, the deployment made some for us. Let’s look at those</a:t>
+            </a:r>
+          </a:p>
+          <a:p>
+            <a:r>
+              <a:rPr lang="en-US" dirty="0" err="1"/>
+              <a:t>Kubectl</a:t>
+            </a:r>
+            <a:r>
+              <a:rPr lang="en-US" dirty="0"/>
+              <a:t> get pods -l run=hello-world</a:t>
+            </a:r>
+          </a:p>
+          <a:p>
+            <a:r>
+              <a:rPr lang="en-US" dirty="0"/>
+              <a:t>We can see that it has status running. Everything looks okay.</a:t>
+            </a:r>
+          </a:p>
+          <a:p>
+            <a:endParaRPr lang="en-US" dirty="0"/>
+          </a:p>
+          <a:p>
+            <a:r>
+              <a:rPr lang="en-US" dirty="0"/>
+              <a:t>Digress into label selectors.</a:t>
+            </a:r>
           </a:p>
         </p:txBody>
       </p:sp>
@@ -2186,7 +2317,7 @@
           <a:p>
             <a:fld id="{3D445AEF-66F2-8F4E-AF73-E138B1B3DC90}" type="slidenum">
               <a:rPr lang="en-US" smtClean="0"/>
-              <a:t>19</a:t>
+              <a:t>20</a:t>
             </a:fld>
             <a:endParaRPr lang="en-US"/>
           </a:p>
@@ -2195,7 +2326,7 @@
     </p:spTree>
     <p:extLst>
       <p:ext uri="{BB962C8B-B14F-4D97-AF65-F5344CB8AC3E}">
-        <p14:creationId xmlns:p14="http://schemas.microsoft.com/office/powerpoint/2010/main" val="1949916094"/>
+        <p14:creationId xmlns:p14="http://schemas.microsoft.com/office/powerpoint/2010/main" val="672761067"/>
       </p:ext>
     </p:extLst>
   </p:cSld>
@@ -2249,40 +2380,12 @@
           <a:bodyPr/>
           <a:lstStyle/>
           <a:p>
-            <a:r>
-              <a:rPr lang="en-US" dirty="0"/>
-              <a:t>‘</a:t>
-            </a:r>
-            <a:r>
-              <a:rPr lang="en-US" dirty="0" err="1"/>
-              <a:t>kubectl</a:t>
-            </a:r>
-            <a:r>
-              <a:rPr lang="en-US" dirty="0"/>
-              <a:t> run’ is not something people would normally use. Most people CRUD </a:t>
-            </a:r>
-            <a:r>
-              <a:rPr lang="en-US" dirty="0" err="1"/>
-              <a:t>yaml</a:t>
-            </a:r>
-            <a:r>
-              <a:rPr lang="en-US" dirty="0"/>
-              <a:t>. For our purpose here, it’s a convenient shortcut.</a:t>
-            </a:r>
-          </a:p>
-          <a:p>
             <a:endParaRPr lang="en-US" dirty="0"/>
           </a:p>
           <a:p>
             <a:r>
               <a:rPr lang="en-US" dirty="0"/>
-              <a:t>The particular invocation of run will result in a deployment. Let’s look at the status of the deployment. </a:t>
-            </a:r>
-          </a:p>
-          <a:p>
-            <a:r>
-              <a:rPr lang="en-US" dirty="0"/>
-              <a:t>Let’s examine the columns. With the “DESIRED” column we can be immediately reminded of </a:t>
+              <a:t>It’s no use running something if we can’t talk to it to see what it’s doing. Got to give it input, and get results out of it. To do that, </a:t>
             </a:r>
             <a:r>
               <a:rPr lang="en-US" dirty="0" err="1"/>
@@ -2290,21 +2393,7 @@
             </a:r>
             <a:r>
               <a:rPr lang="en-US" dirty="0"/>
-              <a:t> desired state model. </a:t>
-            </a:r>
-          </a:p>
-          <a:p>
-            <a:r>
-              <a:rPr lang="en-US" dirty="0"/>
-              <a:t>If we run it quickly enough, we can see that the other columns are in </a:t>
-            </a:r>
-            <a:r>
-              <a:rPr lang="en-US" dirty="0" err="1"/>
-              <a:t>vearious</a:t>
-            </a:r>
-            <a:r>
-              <a:rPr lang="en-US" dirty="0"/>
-              <a:t> states of 1 or 0 as the container starts up and becomes reachable.</a:t>
+              <a:t> has the service concept.</a:t>
             </a:r>
           </a:p>
           <a:p>
@@ -2313,32 +2402,7 @@
           <a:p>
             <a:r>
               <a:rPr lang="en-US" dirty="0"/>
-              <a:t>What happened to all the pods we talked about earlier. Well, the deployment made some for us. Let’s look at those</a:t>
-            </a:r>
-          </a:p>
-          <a:p>
-            <a:r>
-              <a:rPr lang="en-US" dirty="0" err="1"/>
-              <a:t>Kubectl</a:t>
-            </a:r>
-            <a:r>
-              <a:rPr lang="en-US" dirty="0"/>
-              <a:t> get pods -l run=hello-world</a:t>
-            </a:r>
-          </a:p>
-          <a:p>
-            <a:r>
-              <a:rPr lang="en-US" dirty="0"/>
-              <a:t>We can see that it has status running. Everything looks okay.</a:t>
-            </a:r>
-          </a:p>
-          <a:p>
-            <a:endParaRPr lang="en-US" dirty="0"/>
-          </a:p>
-          <a:p>
-            <a:r>
-              <a:rPr lang="en-US" dirty="0"/>
-              <a:t>Digress into label selectors.</a:t>
+              <a:t>Check out label selectors once it’s deployed.</a:t>
             </a:r>
           </a:p>
         </p:txBody>
@@ -2360,7 +2424,7 @@
           <a:p>
             <a:fld id="{3D445AEF-66F2-8F4E-AF73-E138B1B3DC90}" type="slidenum">
               <a:rPr lang="en-US" smtClean="0"/>
-              <a:t>20</a:t>
+              <a:t>21</a:t>
             </a:fld>
             <a:endParaRPr lang="en-US"/>
           </a:p>
@@ -2369,7 +2433,7 @@
     </p:spTree>
     <p:extLst>
       <p:ext uri="{BB962C8B-B14F-4D97-AF65-F5344CB8AC3E}">
-        <p14:creationId xmlns:p14="http://schemas.microsoft.com/office/powerpoint/2010/main" val="672761067"/>
+        <p14:creationId xmlns:p14="http://schemas.microsoft.com/office/powerpoint/2010/main" val="4143521813"/>
       </p:ext>
     </p:extLst>
   </p:cSld>
@@ -2424,52 +2488,52 @@
           <a:lstStyle/>
           <a:p>
             <a:r>
-              <a:rPr lang="en-US" dirty="0" smtClean="0"/>
+              <a:rPr lang="en-US" dirty="0"/>
               <a:t>Before we talk about Kubernetes, we need to understand Containers. There are many tools that help</a:t>
             </a:r>
             <a:r>
-              <a:rPr lang="en-US" baseline="0" dirty="0" smtClean="0"/>
+              <a:rPr lang="en-US" baseline="0" dirty="0"/>
               <a:t> build containerized applications, Docker was successful in popularizing the technology. There are other players such as LXC, </a:t>
             </a:r>
             <a:r>
-              <a:rPr lang="en-US" baseline="0" dirty="0" err="1" smtClean="0"/>
+              <a:rPr lang="en-US" baseline="0" dirty="0" err="1"/>
               <a:t>etc</a:t>
             </a:r>
             <a:r>
-              <a:rPr lang="en-US" baseline="0" dirty="0" smtClean="0"/>
+              <a:rPr lang="en-US" baseline="0" dirty="0"/>
               <a:t> for your choice. </a:t>
             </a:r>
           </a:p>
           <a:p>
             <a:r>
-              <a:rPr lang="en-US" baseline="0" dirty="0" smtClean="0"/>
+              <a:rPr lang="en-US" baseline="0" dirty="0"/>
               <a:t>We need Docker locally to build a </a:t>
             </a:r>
             <a:r>
-              <a:rPr lang="en-US" baseline="0" dirty="0" err="1" smtClean="0"/>
+              <a:rPr lang="en-US" baseline="0" dirty="0" err="1"/>
               <a:t>continerized</a:t>
             </a:r>
             <a:r>
-              <a:rPr lang="en-US" baseline="0" dirty="0" smtClean="0"/>
+              <a:rPr lang="en-US" baseline="0" dirty="0"/>
               <a:t> application. We also need a cluster running Kubernetes for which we discuss how to use either IBM Cloud as a Kubernetes provider. We will use Kubernetes client </a:t>
             </a:r>
             <a:r>
-              <a:rPr lang="en-US" baseline="0" dirty="0" err="1" smtClean="0"/>
+              <a:rPr lang="en-US" baseline="0" dirty="0" err="1"/>
               <a:t>Kubectl</a:t>
             </a:r>
             <a:r>
-              <a:rPr lang="en-US" baseline="0" dirty="0" smtClean="0"/>
+              <a:rPr lang="en-US" baseline="0" dirty="0"/>
               <a:t> to deploy the application.</a:t>
             </a:r>
           </a:p>
           <a:p>
             <a:r>
-              <a:rPr lang="en-US" baseline="0" dirty="0" smtClean="0"/>
+              <a:rPr lang="en-US" baseline="0" dirty="0"/>
               <a:t>Kubernetes uses containers and orchestration to build useful applications. We talk about basic building blocks in Kubernetes to deploy a simple application and demonstrate how we scale it.</a:t>
             </a:r>
           </a:p>
           <a:p>
-            <a:endParaRPr lang="en-US" baseline="0" dirty="0" smtClean="0"/>
+            <a:endParaRPr lang="en-US" baseline="0" dirty="0"/>
           </a:p>
           <a:p>
             <a:endParaRPr lang="en-US" dirty="0"/>
@@ -2556,12 +2620,26 @@
           <a:bodyPr/>
           <a:lstStyle/>
           <a:p>
+            <a:r>
+              <a:rPr lang="en-US" dirty="0"/>
+              <a:t>Run the expose command.</a:t>
+            </a:r>
+          </a:p>
+          <a:p>
             <a:endParaRPr lang="en-US" dirty="0"/>
           </a:p>
           <a:p>
             <a:r>
               <a:rPr lang="en-US" dirty="0"/>
-              <a:t>It’s no use running something if we can’t talk to it to see what it’s doing. Got to give it input, and get results out of it. To do that, </a:t>
+              <a:t>As it is a </a:t>
+            </a:r>
+            <a:r>
+              <a:rPr lang="en-US" dirty="0" err="1"/>
+              <a:t>nodeport</a:t>
+            </a:r>
+            <a:r>
+              <a:rPr lang="en-US" dirty="0"/>
+              <a:t>, </a:t>
             </a:r>
             <a:r>
               <a:rPr lang="en-US" dirty="0" err="1"/>
@@ -2569,7 +2647,7 @@
             </a:r>
             <a:r>
               <a:rPr lang="en-US" dirty="0"/>
-              <a:t> has the service concept.</a:t>
+              <a:t> will automatically allocate a port on the workers to be externally available.</a:t>
             </a:r>
           </a:p>
           <a:p>
@@ -2578,7 +2656,15 @@
           <a:p>
             <a:r>
               <a:rPr lang="en-US" dirty="0"/>
-              <a:t>Check out label selectors once it’s deployed.</a:t>
+              <a:t>We need to know how to connect to the worker. It’s running in IBM cloud so we’ll need the </a:t>
+            </a:r>
+            <a:r>
+              <a:rPr lang="en-US" dirty="0" err="1"/>
+              <a:t>bx</a:t>
+            </a:r>
+            <a:r>
+              <a:rPr lang="en-US" dirty="0"/>
+              <a:t> command.</a:t>
             </a:r>
           </a:p>
         </p:txBody>
@@ -2600,7 +2686,7 @@
           <a:p>
             <a:fld id="{3D445AEF-66F2-8F4E-AF73-E138B1B3DC90}" type="slidenum">
               <a:rPr lang="en-US" smtClean="0"/>
-              <a:t>21</a:t>
+              <a:t>22</a:t>
             </a:fld>
             <a:endParaRPr lang="en-US"/>
           </a:p>
@@ -2609,7 +2695,7 @@
     </p:spTree>
     <p:extLst>
       <p:ext uri="{BB962C8B-B14F-4D97-AF65-F5344CB8AC3E}">
-        <p14:creationId xmlns:p14="http://schemas.microsoft.com/office/powerpoint/2010/main" val="4143521813"/>
+        <p14:creationId xmlns:p14="http://schemas.microsoft.com/office/powerpoint/2010/main" val="3975721492"/>
       </p:ext>
     </p:extLst>
   </p:cSld>
@@ -2665,50 +2751,13 @@
           <a:p>
             <a:r>
               <a:rPr lang="en-US" dirty="0"/>
-              <a:t>Run the expose command.</a:t>
-            </a:r>
-          </a:p>
-          <a:p>
+              <a:t>Curl is a command to access the app over the web. Can also open</a:t>
+            </a:r>
+            <a:r>
+              <a:rPr lang="en-US" baseline="0" dirty="0"/>
+              <a:t> it in the browser. </a:t>
+            </a:r>
             <a:endParaRPr lang="en-US" dirty="0"/>
-          </a:p>
-          <a:p>
-            <a:r>
-              <a:rPr lang="en-US" dirty="0"/>
-              <a:t>As it is a </a:t>
-            </a:r>
-            <a:r>
-              <a:rPr lang="en-US" dirty="0" err="1"/>
-              <a:t>nodeport</a:t>
-            </a:r>
-            <a:r>
-              <a:rPr lang="en-US" dirty="0"/>
-              <a:t>, </a:t>
-            </a:r>
-            <a:r>
-              <a:rPr lang="en-US" dirty="0" err="1"/>
-              <a:t>kubernetes</a:t>
-            </a:r>
-            <a:r>
-              <a:rPr lang="en-US" dirty="0"/>
-              <a:t> will automatically allocate a port on the workers to be externally available.</a:t>
-            </a:r>
-          </a:p>
-          <a:p>
-            <a:endParaRPr lang="en-US" dirty="0"/>
-          </a:p>
-          <a:p>
-            <a:r>
-              <a:rPr lang="en-US" dirty="0"/>
-              <a:t>We need to know how to connect to the worker. It’s running in IBM cloud so we’ll need the </a:t>
-            </a:r>
-            <a:r>
-              <a:rPr lang="en-US" dirty="0" err="1"/>
-              <a:t>bx</a:t>
-            </a:r>
-            <a:r>
-              <a:rPr lang="en-US" dirty="0"/>
-              <a:t> command.</a:t>
-            </a:r>
           </a:p>
         </p:txBody>
       </p:sp>
@@ -2729,7 +2778,7 @@
           <a:p>
             <a:fld id="{3D445AEF-66F2-8F4E-AF73-E138B1B3DC90}" type="slidenum">
               <a:rPr lang="en-US" smtClean="0"/>
-              <a:t>22</a:t>
+              <a:t>23</a:t>
             </a:fld>
             <a:endParaRPr lang="en-US"/>
           </a:p>
@@ -2738,7 +2787,7 @@
     </p:spTree>
     <p:extLst>
       <p:ext uri="{BB962C8B-B14F-4D97-AF65-F5344CB8AC3E}">
-        <p14:creationId xmlns:p14="http://schemas.microsoft.com/office/powerpoint/2010/main" val="3975721492"/>
+        <p14:creationId xmlns:p14="http://schemas.microsoft.com/office/powerpoint/2010/main" val="930375115"/>
       </p:ext>
     </p:extLst>
   </p:cSld>
@@ -2792,14 +2841,6 @@
           <a:bodyPr/>
           <a:lstStyle/>
           <a:p>
-            <a:r>
-              <a:rPr lang="en-US" dirty="0" smtClean="0"/>
-              <a:t>Curl is a command to access the app over the web. Can also open</a:t>
-            </a:r>
-            <a:r>
-              <a:rPr lang="en-US" baseline="0" dirty="0" smtClean="0"/>
-              <a:t> it in the browser. </a:t>
-            </a:r>
             <a:endParaRPr lang="en-US" dirty="0"/>
           </a:p>
         </p:txBody>
@@ -2819,18 +2860,18 @@
           <a:bodyPr/>
           <a:lstStyle/>
           <a:p>
-            <a:fld id="{3D445AEF-66F2-8F4E-AF73-E138B1B3DC90}" type="slidenum">
+            <a:fld id="{91BC27E2-96B7-4D9C-83E2-3228FBB444E0}" type="slidenum">
               <a:rPr lang="en-US" smtClean="0"/>
-              <a:t>23</a:t>
+              <a:t>24</a:t>
             </a:fld>
-            <a:endParaRPr lang="en-US"/>
+            <a:endParaRPr lang="en-US" dirty="0"/>
           </a:p>
         </p:txBody>
       </p:sp>
     </p:spTree>
     <p:extLst>
       <p:ext uri="{BB962C8B-B14F-4D97-AF65-F5344CB8AC3E}">
-        <p14:creationId xmlns:p14="http://schemas.microsoft.com/office/powerpoint/2010/main" val="930375115"/>
+        <p14:creationId xmlns:p14="http://schemas.microsoft.com/office/powerpoint/2010/main" val="2396754705"/>
       </p:ext>
     </p:extLst>
   </p:cSld>
@@ -2903,18 +2944,18 @@
           <a:bodyPr/>
           <a:lstStyle/>
           <a:p>
-            <a:fld id="{91BC27E2-96B7-4D9C-83E2-3228FBB444E0}" type="slidenum">
+            <a:fld id="{3D445AEF-66F2-8F4E-AF73-E138B1B3DC90}" type="slidenum">
               <a:rPr lang="en-US" smtClean="0"/>
-              <a:t>24</a:t>
+              <a:t>25</a:t>
             </a:fld>
-            <a:endParaRPr lang="en-US" dirty="0"/>
+            <a:endParaRPr lang="en-US"/>
           </a:p>
         </p:txBody>
       </p:sp>
     </p:spTree>
     <p:extLst>
       <p:ext uri="{BB962C8B-B14F-4D97-AF65-F5344CB8AC3E}">
-        <p14:creationId xmlns:p14="http://schemas.microsoft.com/office/powerpoint/2010/main" val="2396754705"/>
+        <p14:creationId xmlns:p14="http://schemas.microsoft.com/office/powerpoint/2010/main" val="224556732"/>
       </p:ext>
     </p:extLst>
   </p:cSld>
@@ -2968,6 +3009,57 @@
           <a:bodyPr/>
           <a:lstStyle/>
           <a:p>
+            <a:r>
+              <a:rPr lang="en-US" dirty="0"/>
+              <a:t>Talk about the intermediate object of replica sets, and that it’s </a:t>
+            </a:r>
+            <a:r>
+              <a:rPr lang="en-US" dirty="0" err="1"/>
+              <a:t>kubernetes</a:t>
+            </a:r>
+            <a:r>
+              <a:rPr lang="en-US" dirty="0"/>
+              <a:t> providing infrastructure for you</a:t>
+            </a:r>
+          </a:p>
+          <a:p>
+            <a:r>
+              <a:rPr lang="en-US" dirty="0"/>
+              <a:t>Why do they exist? To make scaling and switching between easier.</a:t>
+            </a:r>
+          </a:p>
+          <a:p>
+            <a:endParaRPr lang="en-US" dirty="0"/>
+          </a:p>
+          <a:p>
+            <a:r>
+              <a:rPr lang="en-US" dirty="0"/>
+              <a:t>What we’re doing here is showing change over time. Not just that we’re adding more capacity, but also that we’ve got different versions?</a:t>
+            </a:r>
+          </a:p>
+          <a:p>
+            <a:endParaRPr lang="en-US" dirty="0"/>
+          </a:p>
+          <a:p>
+            <a:r>
+              <a:rPr lang="en-US" dirty="0"/>
+              <a:t>What we didn’t show you earlier, was that the deployment created a </a:t>
+            </a:r>
+            <a:r>
+              <a:rPr lang="en-US" dirty="0" err="1"/>
+              <a:t>replicaset</a:t>
+            </a:r>
+            <a:r>
+              <a:rPr lang="en-US" dirty="0"/>
+              <a:t> which</a:t>
+            </a:r>
+            <a:r>
+              <a:rPr lang="en-US" baseline="0" dirty="0"/>
+              <a:t> created pods.</a:t>
+            </a:r>
+            <a:endParaRPr lang="en-US" dirty="0"/>
+          </a:p>
+          <a:p>
             <a:endParaRPr lang="en-US" dirty="0"/>
           </a:p>
         </p:txBody>
@@ -2989,7 +3081,7 @@
           <a:p>
             <a:fld id="{3D445AEF-66F2-8F4E-AF73-E138B1B3DC90}" type="slidenum">
               <a:rPr lang="en-US" smtClean="0"/>
-              <a:t>25</a:t>
+              <a:t>26</a:t>
             </a:fld>
             <a:endParaRPr lang="en-US"/>
           </a:p>
@@ -2998,7 +3090,7 @@
     </p:spTree>
     <p:extLst>
       <p:ext uri="{BB962C8B-B14F-4D97-AF65-F5344CB8AC3E}">
-        <p14:creationId xmlns:p14="http://schemas.microsoft.com/office/powerpoint/2010/main" val="224556732"/>
+        <p14:creationId xmlns:p14="http://schemas.microsoft.com/office/powerpoint/2010/main" val="2458773669"/>
       </p:ext>
     </p:extLst>
   </p:cSld>
@@ -3054,55 +3146,68 @@
           <a:p>
             <a:r>
               <a:rPr lang="en-US" dirty="0"/>
-              <a:t>Talk about the intermediate object of replica sets, and that it’s </a:t>
+              <a:t>Focus on replica sets as deployment now has two pointers, </a:t>
+            </a:r>
+          </a:p>
+          <a:p>
+            <a:r>
+              <a:rPr lang="en-US" dirty="0"/>
+              <a:t>Scale one up while we scale the other down. Always some good ones</a:t>
+            </a:r>
+            <a:r>
+              <a:rPr lang="en-US" baseline="0" dirty="0"/>
+              <a:t> at all times.</a:t>
+            </a:r>
+          </a:p>
+          <a:p>
+            <a:endParaRPr lang="en-US" baseline="0" dirty="0"/>
+          </a:p>
+          <a:p>
+            <a:r>
+              <a:rPr lang="en-US" baseline="0" dirty="0"/>
+              <a:t>For example `</a:t>
+            </a:r>
+            <a:r>
+              <a:rPr lang="en-US" baseline="0" dirty="0" err="1"/>
+              <a:t>kubectl</a:t>
+            </a:r>
+            <a:r>
+              <a:rPr lang="en-US" baseline="0" dirty="0"/>
+              <a:t> get </a:t>
+            </a:r>
+            <a:r>
+              <a:rPr lang="en-US" baseline="0" dirty="0" err="1"/>
+              <a:t>rs</a:t>
+            </a:r>
+            <a:r>
+              <a:rPr lang="en-US" baseline="0" dirty="0"/>
+              <a:t> -l app=hello` with </a:t>
+            </a:r>
+            <a:r>
+              <a:rPr lang="mr-IN" baseline="0" dirty="0"/>
+              <a:t>–</a:t>
+            </a:r>
+            <a:r>
+              <a:rPr lang="en-US" baseline="0" dirty="0"/>
+              <a:t>watch </a:t>
+            </a:r>
+            <a:r>
+              <a:rPr lang="en-US" baseline="0"/>
+              <a:t>to observe over time</a:t>
+            </a:r>
+            <a:endParaRPr lang="en-US" dirty="0"/>
+          </a:p>
+          <a:p>
+            <a:endParaRPr lang="en-US" dirty="0"/>
+          </a:p>
+          <a:p>
+            <a:r>
+              <a:rPr lang="en-US" dirty="0"/>
+              <a:t>Recap backwards to services as label selector, spread out across pods in different </a:t>
             </a:r>
             <a:r>
               <a:rPr lang="en-US" dirty="0" err="1"/>
-              <a:t>kubernetes</a:t>
-            </a:r>
-            <a:r>
-              <a:rPr lang="en-US" dirty="0"/>
-              <a:t> providing infrastructure for you</a:t>
-            </a:r>
-          </a:p>
-          <a:p>
-            <a:r>
-              <a:rPr lang="en-US" dirty="0"/>
-              <a:t>Why do they exist? To make scaling and switching between easier.</a:t>
-            </a:r>
-          </a:p>
-          <a:p>
-            <a:endParaRPr lang="en-US" dirty="0"/>
-          </a:p>
-          <a:p>
-            <a:r>
-              <a:rPr lang="en-US" dirty="0"/>
-              <a:t>What we’re doing here is showing change over time. Not just that we’re adding more capacity, but also that we’ve got different versions?</a:t>
-            </a:r>
-          </a:p>
-          <a:p>
-            <a:endParaRPr lang="en-US" dirty="0"/>
-          </a:p>
-          <a:p>
-            <a:r>
-              <a:rPr lang="en-US" dirty="0"/>
-              <a:t>What we didn’t show you earlier, </a:t>
-            </a:r>
-            <a:r>
-              <a:rPr lang="en-US" dirty="0" smtClean="0"/>
-              <a:t>was that the deployment created a </a:t>
-            </a:r>
-            <a:r>
-              <a:rPr lang="en-US" dirty="0" err="1" smtClean="0"/>
-              <a:t>replicaset</a:t>
-            </a:r>
-            <a:r>
-              <a:rPr lang="en-US" dirty="0" smtClean="0"/>
-              <a:t> which</a:t>
-            </a:r>
-            <a:r>
-              <a:rPr lang="en-US" baseline="0" dirty="0" smtClean="0"/>
-              <a:t> created pods.</a:t>
+              <a:t>replicastes</a:t>
             </a:r>
             <a:endParaRPr lang="en-US" dirty="0"/>
           </a:p>
@@ -3128,7 +3233,7 @@
           <a:p>
             <a:fld id="{3D445AEF-66F2-8F4E-AF73-E138B1B3DC90}" type="slidenum">
               <a:rPr lang="en-US" smtClean="0"/>
-              <a:t>26</a:t>
+              <a:t>27</a:t>
             </a:fld>
             <a:endParaRPr lang="en-US"/>
           </a:p>
@@ -3137,7 +3242,7 @@
     </p:spTree>
     <p:extLst>
       <p:ext uri="{BB962C8B-B14F-4D97-AF65-F5344CB8AC3E}">
-        <p14:creationId xmlns:p14="http://schemas.microsoft.com/office/powerpoint/2010/main" val="2458773669"/>
+        <p14:creationId xmlns:p14="http://schemas.microsoft.com/office/powerpoint/2010/main" val="4198252815"/>
       </p:ext>
     </p:extLst>
   </p:cSld>
@@ -3191,109 +3296,37 @@
           <a:bodyPr/>
           <a:lstStyle/>
           <a:p>
-            <a:r>
-              <a:rPr lang="en-US" dirty="0"/>
-              <a:t>Focus on replica sets as deployment now has two pointers, </a:t>
-            </a:r>
-          </a:p>
-          <a:p>
-            <a:r>
-              <a:rPr lang="en-US" dirty="0"/>
-              <a:t>Scale one up while we scale the other down. Always some good </a:t>
-            </a:r>
-            <a:r>
-              <a:rPr lang="en-US" dirty="0" smtClean="0"/>
-              <a:t>ones</a:t>
-            </a:r>
-            <a:r>
-              <a:rPr lang="en-US" baseline="0" dirty="0" smtClean="0"/>
-              <a:t> at all times.</a:t>
-            </a:r>
-          </a:p>
-          <a:p>
-            <a:endParaRPr lang="en-US" baseline="0" dirty="0" smtClean="0"/>
-          </a:p>
-          <a:p>
-            <a:r>
-              <a:rPr lang="en-US" baseline="0" dirty="0" smtClean="0"/>
-              <a:t>For example `</a:t>
-            </a:r>
-            <a:r>
-              <a:rPr lang="en-US" baseline="0" dirty="0" err="1" smtClean="0"/>
-              <a:t>kubectl</a:t>
-            </a:r>
-            <a:r>
-              <a:rPr lang="en-US" baseline="0" dirty="0" smtClean="0"/>
-              <a:t> get </a:t>
-            </a:r>
-            <a:r>
-              <a:rPr lang="en-US" baseline="0" dirty="0" err="1" smtClean="0"/>
-              <a:t>rs</a:t>
-            </a:r>
-            <a:r>
-              <a:rPr lang="en-US" baseline="0" dirty="0" smtClean="0"/>
-              <a:t> -l app=hello` with </a:t>
-            </a:r>
-            <a:r>
-              <a:rPr lang="mr-IN" baseline="0" dirty="0" smtClean="0"/>
-              <a:t>–</a:t>
-            </a:r>
-            <a:r>
-              <a:rPr lang="en-US" baseline="0" dirty="0" smtClean="0"/>
-              <a:t>watch </a:t>
-            </a:r>
-            <a:r>
-              <a:rPr lang="en-US" baseline="0" smtClean="0"/>
-              <a:t>to observe over time</a:t>
-            </a:r>
             <a:endParaRPr lang="en-US" dirty="0"/>
           </a:p>
-          <a:p>
+        </p:txBody>
+      </p:sp>
+      <p:sp>
+        <p:nvSpPr>
+          <p:cNvPr id="4" name="Slide Number Placeholder 3"/>
+          <p:cNvSpPr>
+            <a:spLocks noGrp="1"/>
+          </p:cNvSpPr>
+          <p:nvPr>
+            <p:ph type="sldNum" sz="quarter" idx="10"/>
+          </p:nvPr>
+        </p:nvSpPr>
+        <p:spPr/>
+        <p:txBody>
+          <a:bodyPr/>
+          <a:lstStyle/>
+          <a:p>
+            <a:fld id="{91BC27E2-96B7-4D9C-83E2-3228FBB444E0}" type="slidenum">
+              <a:rPr lang="en-US" smtClean="0"/>
+              <a:t>28</a:t>
+            </a:fld>
             <a:endParaRPr lang="en-US" dirty="0"/>
-          </a:p>
-          <a:p>
-            <a:r>
-              <a:rPr lang="en-US" dirty="0"/>
-              <a:t>Recap backwards to services as label selector, spread out across pods in different </a:t>
-            </a:r>
-            <a:r>
-              <a:rPr lang="en-US" dirty="0" err="1"/>
-              <a:t>replicastes</a:t>
-            </a:r>
-            <a:endParaRPr lang="en-US" dirty="0"/>
-          </a:p>
-          <a:p>
-            <a:endParaRPr lang="en-US" dirty="0"/>
-          </a:p>
-        </p:txBody>
-      </p:sp>
-      <p:sp>
-        <p:nvSpPr>
-          <p:cNvPr id="4" name="Slide Number Placeholder 3"/>
-          <p:cNvSpPr>
-            <a:spLocks noGrp="1"/>
-          </p:cNvSpPr>
-          <p:nvPr>
-            <p:ph type="sldNum" sz="quarter" idx="10"/>
-          </p:nvPr>
-        </p:nvSpPr>
-        <p:spPr/>
-        <p:txBody>
-          <a:bodyPr/>
-          <a:lstStyle/>
-          <a:p>
-            <a:fld id="{3D445AEF-66F2-8F4E-AF73-E138B1B3DC90}" type="slidenum">
-              <a:rPr lang="en-US" smtClean="0"/>
-              <a:t>27</a:t>
-            </a:fld>
-            <a:endParaRPr lang="en-US"/>
           </a:p>
         </p:txBody>
       </p:sp>
     </p:spTree>
     <p:extLst>
       <p:ext uri="{BB962C8B-B14F-4D97-AF65-F5344CB8AC3E}">
-        <p14:creationId xmlns:p14="http://schemas.microsoft.com/office/powerpoint/2010/main" val="4198252815"/>
+        <p14:creationId xmlns:p14="http://schemas.microsoft.com/office/powerpoint/2010/main" val="2396754705"/>
       </p:ext>
     </p:extLst>
   </p:cSld>
@@ -3347,102 +3380,12 @@
           <a:bodyPr/>
           <a:lstStyle/>
           <a:p>
-            <a:endParaRPr lang="en-US" dirty="0"/>
-          </a:p>
-        </p:txBody>
-      </p:sp>
-      <p:sp>
-        <p:nvSpPr>
-          <p:cNvPr id="4" name="Slide Number Placeholder 3"/>
-          <p:cNvSpPr>
-            <a:spLocks noGrp="1"/>
-          </p:cNvSpPr>
-          <p:nvPr>
-            <p:ph type="sldNum" sz="quarter" idx="10"/>
-          </p:nvPr>
-        </p:nvSpPr>
-        <p:spPr/>
-        <p:txBody>
-          <a:bodyPr/>
-          <a:lstStyle/>
-          <a:p>
-            <a:fld id="{91BC27E2-96B7-4D9C-83E2-3228FBB444E0}" type="slidenum">
-              <a:rPr lang="en-US" smtClean="0"/>
-              <a:t>28</a:t>
-            </a:fld>
-            <a:endParaRPr lang="en-US" dirty="0"/>
-          </a:p>
-        </p:txBody>
-      </p:sp>
-    </p:spTree>
-    <p:extLst>
-      <p:ext uri="{BB962C8B-B14F-4D97-AF65-F5344CB8AC3E}">
-        <p14:creationId xmlns:p14="http://schemas.microsoft.com/office/powerpoint/2010/main" val="2396754705"/>
-      </p:ext>
-    </p:extLst>
-  </p:cSld>
-  <p:clrMapOvr>
-    <a:masterClrMapping/>
-  </p:clrMapOvr>
-</p:notes>
-</file>
-
-<file path=ppt/notesSlides/notesSlide28.xml><?xml version="1.0" encoding="utf-8"?>
-<p:notes xmlns:a="http://schemas.openxmlformats.org/drawingml/2006/main" xmlns:r="http://schemas.openxmlformats.org/officeDocument/2006/relationships" xmlns:p="http://schemas.openxmlformats.org/presentationml/2006/main">
-  <p:cSld>
-    <p:spTree>
-      <p:nvGrpSpPr>
-        <p:cNvPr id="1" name=""/>
-        <p:cNvGrpSpPr/>
-        <p:nvPr/>
-      </p:nvGrpSpPr>
-      <p:grpSpPr>
-        <a:xfrm>
-          <a:off x="0" y="0"/>
-          <a:ext cx="0" cy="0"/>
-          <a:chOff x="0" y="0"/>
-          <a:chExt cx="0" cy="0"/>
-        </a:xfrm>
-      </p:grpSpPr>
-      <p:sp>
-        <p:nvSpPr>
-          <p:cNvPr id="2" name="Slide Image Placeholder 1"/>
-          <p:cNvSpPr>
-            <a:spLocks noGrp="1" noRot="1" noChangeAspect="1"/>
-          </p:cNvSpPr>
-          <p:nvPr>
-            <p:ph type="sldImg"/>
-          </p:nvPr>
-        </p:nvSpPr>
-        <p:spPr/>
-      </p:sp>
-      <p:sp>
-        <p:nvSpPr>
-          <p:cNvPr id="3" name="Notes Placeholder 2"/>
-          <p:cNvSpPr>
-            <a:spLocks noGrp="1"/>
-          </p:cNvSpPr>
-          <p:nvPr>
-            <p:ph type="body" idx="1"/>
-          </p:nvPr>
-        </p:nvSpPr>
-        <p:spPr/>
-        <p:txBody>
-          <a:bodyPr/>
-          <a:lstStyle/>
-          <a:p>
             <a:pPr rtl="0"/>
             <a:endParaRPr lang="en-US" b="0" dirty="0">
               <a:effectLst/>
             </a:endParaRPr>
           </a:p>
           <a:p>
-            <a:r>
-              <a:rPr lang="en-US" b="0" dirty="0">
-                <a:effectLst/>
-              </a:rPr>
-              <a:t/>
-            </a:r>
             <a:br>
               <a:rPr lang="en-US" b="0" dirty="0">
                 <a:effectLst/>
@@ -3649,35 +3592,30 @@
             </a:r>
             <a:r>
               <a:rPr lang="en-US" baseline="0" dirty="0"/>
-              <a:t> Operating System level. Multiple independent OS, vs one OS with multiple independent processes</a:t>
-            </a:r>
-            <a:r>
-              <a:rPr lang="en-US" baseline="0" dirty="0" smtClean="0"/>
-              <a:t>. </a:t>
-            </a:r>
+              <a:t> Operating System level. Multiple independent OS, vs one OS with multiple independent processes. </a:t>
+            </a:r>
+          </a:p>
+          <a:p>
+            <a:r>
+              <a:rPr lang="en-US" baseline="0" dirty="0"/>
+              <a:t>Namespaces provide a container its own process space, network interface, root file system, etc. </a:t>
+            </a:r>
+            <a:r>
+              <a:rPr lang="en-US" baseline="0" dirty="0" err="1"/>
+              <a:t>Cgroups</a:t>
+            </a:r>
+            <a:r>
+              <a:rPr lang="en-US" baseline="0" dirty="0"/>
+              <a:t> provide container with resource metering and limits.</a:t>
+            </a:r>
+          </a:p>
+          <a:p>
             <a:endParaRPr lang="en-US" baseline="0" dirty="0"/>
           </a:p>
           <a:p>
-            <a:r>
-              <a:rPr lang="en-US" baseline="0" dirty="0" smtClean="0"/>
-              <a:t>Namespaces provide a container its own process space, network interface, root file system, etc. </a:t>
-            </a:r>
-            <a:r>
-              <a:rPr lang="en-US" baseline="0" dirty="0" err="1" smtClean="0"/>
-              <a:t>Cgroups</a:t>
-            </a:r>
-            <a:r>
-              <a:rPr lang="en-US" baseline="0" dirty="0" smtClean="0"/>
-              <a:t> provide container with resource metering and limits.</a:t>
-            </a:r>
-          </a:p>
-          <a:p>
-            <a:endParaRPr lang="en-US" baseline="0" dirty="0" smtClean="0"/>
-          </a:p>
-          <a:p>
             <a:pPr rtl="0"/>
             <a:r>
-              <a:rPr lang="en-US" sz="1200" b="0" i="0" u="none" strike="noStrike" kern="1200" dirty="0" smtClean="0">
+              <a:rPr lang="en-US" sz="1200" b="0" i="0" u="none" strike="noStrike" kern="1200" dirty="0">
                 <a:solidFill>
                   <a:schemeClr val="tx1"/>
                 </a:solidFill>
@@ -3689,7 +3627,7 @@
               <a:t>Containers allows you to run securely isolated applications with quotas on system resources. Containers started out as an individual features delivered with of the Linux kernel, that were commonly used together. Docker launched with the promise of making containers easy to use and developers quickly latched onto that idea., the company, packaged up these features into a simple and convenient tool, also called </a:t>
             </a:r>
             <a:r>
-              <a:rPr lang="en-US" sz="1200" b="0" i="0" u="none" strike="noStrike" kern="1200" dirty="0" err="1" smtClean="0">
+              <a:rPr lang="en-US" sz="1200" b="0" i="0" u="none" strike="noStrike" kern="1200" dirty="0" err="1">
                 <a:solidFill>
                   <a:schemeClr val="tx1"/>
                 </a:solidFill>
@@ -3701,7 +3639,7 @@
               <a:t>docker</a:t>
             </a:r>
             <a:r>
-              <a:rPr lang="en-US" sz="1200" b="0" i="0" u="none" strike="noStrike" kern="1200" dirty="0" smtClean="0">
+              <a:rPr lang="en-US" sz="1200" b="0" i="0" u="none" strike="noStrike" kern="1200" dirty="0">
                 <a:solidFill>
                   <a:schemeClr val="tx1"/>
                 </a:solidFill>
@@ -3713,7 +3651,7 @@
               <a:t>. Containers have also sparked an interest in </a:t>
             </a:r>
             <a:r>
-              <a:rPr lang="en-US" sz="1200" b="0" i="0" u="none" strike="noStrike" kern="1200" dirty="0" err="1" smtClean="0">
+              <a:rPr lang="en-US" sz="1200" b="0" i="0" u="none" strike="noStrike" kern="1200" dirty="0" err="1">
                 <a:solidFill>
                   <a:schemeClr val="tx1"/>
                 </a:solidFill>
@@ -3725,7 +3663,7 @@
               <a:t>microservice</a:t>
             </a:r>
             <a:r>
-              <a:rPr lang="en-US" sz="1200" b="0" i="0" u="none" strike="noStrike" kern="1200" dirty="0" smtClean="0">
+              <a:rPr lang="en-US" sz="1200" b="0" i="0" u="none" strike="noStrike" kern="1200" dirty="0">
                 <a:solidFill>
                   <a:schemeClr val="tx1"/>
                 </a:solidFill>
@@ -3737,7 +3675,7 @@
               <a:t> architecture, a design pattern for developing applications in which complex applications are broken down into smaller, </a:t>
             </a:r>
             <a:r>
-              <a:rPr lang="en-US" sz="1200" b="0" i="0" u="none" strike="noStrike" kern="1200" dirty="0" err="1" smtClean="0">
+              <a:rPr lang="en-US" sz="1200" b="0" i="0" u="none" strike="noStrike" kern="1200" dirty="0" err="1">
                 <a:solidFill>
                   <a:schemeClr val="tx1"/>
                 </a:solidFill>
@@ -3749,7 +3687,7 @@
               <a:t>composable</a:t>
             </a:r>
             <a:r>
-              <a:rPr lang="en-US" sz="1200" b="0" i="0" u="none" strike="noStrike" kern="1200" dirty="0" smtClean="0">
+              <a:rPr lang="en-US" sz="1200" b="0" i="0" u="none" strike="noStrike" kern="1200" dirty="0">
                 <a:solidFill>
                   <a:schemeClr val="tx1"/>
                 </a:solidFill>
@@ -3761,7 +3699,7 @@
               <a:t> pieces which work together. You </a:t>
             </a:r>
             <a:r>
-              <a:rPr lang="en-US" sz="1200" b="0" i="0" u="none" strike="noStrike" kern="1200" dirty="0" err="1" smtClean="0">
+              <a:rPr lang="en-US" sz="1200" b="0" i="0" u="none" strike="noStrike" kern="1200" dirty="0" err="1">
                 <a:solidFill>
                   <a:schemeClr val="tx1"/>
                 </a:solidFill>
@@ -3773,7 +3711,7 @@
               <a:t>cNowadays</a:t>
             </a:r>
             <a:r>
-              <a:rPr lang="en-US" sz="1200" b="0" i="0" u="none" strike="noStrike" kern="1200" dirty="0" smtClean="0">
+              <a:rPr lang="en-US" sz="1200" b="0" i="0" u="none" strike="noStrike" kern="1200" dirty="0">
                 <a:solidFill>
                   <a:schemeClr val="tx1"/>
                 </a:solidFill>
@@ -3784,21 +3722,17 @@
               </a:rPr>
               <a:t> we can run containers the idea on both Linux and Windows, even though they share little of the same underlying technology.</a:t>
             </a:r>
-            <a:endParaRPr lang="en-US" b="0" dirty="0" smtClean="0">
+            <a:endParaRPr lang="en-US" b="0" dirty="0">
               <a:effectLst/>
             </a:endParaRPr>
           </a:p>
           <a:p>
             <a:pPr rtl="0"/>
-            <a:r>
-              <a:rPr lang="en-US" dirty="0" smtClean="0"/>
-              <a:t/>
-            </a:r>
             <a:br>
-              <a:rPr lang="en-US" dirty="0" smtClean="0"/>
+              <a:rPr lang="en-US" dirty="0"/>
             </a:br>
             <a:r>
-              <a:rPr lang="en-US" sz="1200" b="0" i="0" u="none" strike="noStrike" kern="1200" dirty="0" smtClean="0">
+              <a:rPr lang="en-US" sz="1200" b="0" i="0" u="none" strike="noStrike" kern="1200" dirty="0">
                 <a:solidFill>
                   <a:schemeClr val="tx1"/>
                 </a:solidFill>
@@ -3810,7 +3744,7 @@
               <a:t>Prior to containers, most infrastructure ran not on the bare metal, but within single hypervisors managing multiple virtualized Operating Systems (OSes). This arrangement allowed isolation of applications from one another on a higher level than that provided by the OS. These virtualized </a:t>
             </a:r>
             <a:r>
-              <a:rPr lang="en-US" sz="1200" b="0" i="0" u="none" strike="noStrike" kern="1200" dirty="0" err="1" smtClean="0">
+              <a:rPr lang="en-US" sz="1200" b="0" i="0" u="none" strike="noStrike" kern="1200" dirty="0" err="1">
                 <a:solidFill>
                   <a:schemeClr val="tx1"/>
                 </a:solidFill>
@@ -3822,7 +3756,7 @@
               <a:t>oOperating</a:t>
             </a:r>
             <a:r>
-              <a:rPr lang="en-US" sz="1200" b="0" i="0" u="none" strike="noStrike" kern="1200" dirty="0" smtClean="0">
+              <a:rPr lang="en-US" sz="1200" b="0" i="0" u="none" strike="noStrike" kern="1200" dirty="0">
                 <a:solidFill>
                   <a:schemeClr val="tx1"/>
                 </a:solidFill>
@@ -3834,7 +3768,7 @@
               <a:t> </a:t>
             </a:r>
             <a:r>
-              <a:rPr lang="en-US" sz="1200" b="0" i="0" u="none" strike="noStrike" kern="1200" dirty="0" err="1" smtClean="0">
+              <a:rPr lang="en-US" sz="1200" b="0" i="0" u="none" strike="noStrike" kern="1200" dirty="0" err="1">
                 <a:solidFill>
                   <a:schemeClr val="tx1"/>
                 </a:solidFill>
@@ -3846,7 +3780,7 @@
               <a:t>sSystems</a:t>
             </a:r>
             <a:r>
-              <a:rPr lang="en-US" sz="1200" b="0" i="0" u="none" strike="noStrike" kern="1200" dirty="0" smtClean="0">
+              <a:rPr lang="en-US" sz="1200" b="0" i="0" u="none" strike="noStrike" kern="1200" dirty="0">
                 <a:solidFill>
                   <a:schemeClr val="tx1"/>
                 </a:solidFill>
@@ -3858,7 +3792,7 @@
               <a:t> see what looks like their own exclusive hardware. However, this also means that each of these virtual </a:t>
             </a:r>
             <a:r>
-              <a:rPr lang="en-US" sz="1200" b="0" i="0" u="none" strike="noStrike" kern="1200" dirty="0" err="1" smtClean="0">
+              <a:rPr lang="en-US" sz="1200" b="0" i="0" u="none" strike="noStrike" kern="1200" dirty="0" err="1">
                 <a:solidFill>
                   <a:schemeClr val="tx1"/>
                 </a:solidFill>
@@ -3870,7 +3804,7 @@
               <a:t>oOperating</a:t>
             </a:r>
             <a:r>
-              <a:rPr lang="en-US" sz="1200" b="0" i="0" u="none" strike="noStrike" kern="1200" dirty="0" smtClean="0">
+              <a:rPr lang="en-US" sz="1200" b="0" i="0" u="none" strike="noStrike" kern="1200" dirty="0">
                 <a:solidFill>
                   <a:schemeClr val="tx1"/>
                 </a:solidFill>
@@ -3882,7 +3816,7 @@
               <a:t> </a:t>
             </a:r>
             <a:r>
-              <a:rPr lang="en-US" sz="1200" b="0" i="0" u="none" strike="noStrike" kern="1200" dirty="0" err="1" smtClean="0">
+              <a:rPr lang="en-US" sz="1200" b="0" i="0" u="none" strike="noStrike" kern="1200" dirty="0" err="1">
                 <a:solidFill>
                   <a:schemeClr val="tx1"/>
                 </a:solidFill>
@@ -3894,7 +3828,7 @@
               <a:t>sSystems</a:t>
             </a:r>
             <a:r>
-              <a:rPr lang="en-US" sz="1200" b="0" i="0" u="none" strike="noStrike" kern="1200" dirty="0" smtClean="0">
+              <a:rPr lang="en-US" sz="1200" b="0" i="0" u="none" strike="noStrike" kern="1200" dirty="0">
                 <a:solidFill>
                   <a:schemeClr val="tx1"/>
                 </a:solidFill>
@@ -3906,7 +3840,7 @@
               <a:t> are replicating an entire OS is running all of the standard system daemon processes, such as </a:t>
             </a:r>
             <a:r>
-              <a:rPr lang="en-US" sz="1200" b="0" i="0" u="none" strike="noStrike" kern="1200" dirty="0" err="1" smtClean="0">
+              <a:rPr lang="en-US" sz="1200" b="0" i="0" u="none" strike="noStrike" kern="1200" dirty="0" err="1">
                 <a:solidFill>
                   <a:schemeClr val="tx1"/>
                 </a:solidFill>
@@ -3918,7 +3852,7 @@
               <a:t>init</a:t>
             </a:r>
             <a:r>
-              <a:rPr lang="en-US" sz="1200" b="0" i="0" u="none" strike="noStrike" kern="1200" dirty="0" smtClean="0">
+              <a:rPr lang="en-US" sz="1200" b="0" i="0" u="none" strike="noStrike" kern="1200" dirty="0">
                 <a:solidFill>
                   <a:schemeClr val="tx1"/>
                 </a:solidFill>
@@ -3930,7 +3864,7 @@
               <a:t> and </a:t>
             </a:r>
             <a:r>
-              <a:rPr lang="en-US" sz="1200" b="0" i="0" u="none" strike="noStrike" kern="1200" dirty="0" err="1" smtClean="0">
+              <a:rPr lang="en-US" sz="1200" b="0" i="0" u="none" strike="noStrike" kern="1200" dirty="0" err="1">
                 <a:solidFill>
                   <a:schemeClr val="tx1"/>
                 </a:solidFill>
@@ -3942,7 +3876,7 @@
               <a:t>sshd</a:t>
             </a:r>
             <a:r>
-              <a:rPr lang="en-US" sz="1200" b="0" i="0" u="none" strike="noStrike" kern="1200" dirty="0" smtClean="0">
+              <a:rPr lang="en-US" sz="1200" b="0" i="0" u="none" strike="noStrike" kern="1200" dirty="0">
                 <a:solidFill>
                   <a:schemeClr val="tx1"/>
                 </a:solidFill>
@@ -3953,21 +3887,17 @@
               </a:rPr>
               <a:t>. Additionally, each running instance has a copy of system and application libraries, taking up disk space.</a:t>
             </a:r>
-            <a:endParaRPr lang="en-US" b="0" dirty="0" smtClean="0">
+            <a:endParaRPr lang="en-US" b="0" dirty="0">
               <a:effectLst/>
             </a:endParaRPr>
           </a:p>
           <a:p>
             <a:pPr rtl="0"/>
-            <a:r>
-              <a:rPr lang="en-US" dirty="0" smtClean="0"/>
-              <a:t/>
-            </a:r>
             <a:br>
-              <a:rPr lang="en-US" dirty="0" smtClean="0"/>
+              <a:rPr lang="en-US" dirty="0"/>
             </a:br>
             <a:r>
-              <a:rPr lang="en-US" sz="1200" b="0" i="0" u="none" strike="noStrike" kern="1200" dirty="0" smtClean="0">
+              <a:rPr lang="en-US" sz="1200" b="0" i="0" u="none" strike="noStrike" kern="1200" dirty="0">
                 <a:solidFill>
                   <a:schemeClr val="tx1"/>
                 </a:solidFill>
@@ -3979,7 +3909,7 @@
               <a:t>Containers provide isolation similar to VMs, </a:t>
             </a:r>
             <a:r>
-              <a:rPr lang="en-US" sz="1200" b="0" i="0" u="none" strike="noStrike" kern="1200" dirty="0" err="1" smtClean="0">
+              <a:rPr lang="en-US" sz="1200" b="0" i="0" u="none" strike="noStrike" kern="1200" dirty="0" err="1">
                 <a:solidFill>
                   <a:schemeClr val="tx1"/>
                 </a:solidFill>
@@ -3991,7 +3921,7 @@
               <a:t>exceptbut</a:t>
             </a:r>
             <a:r>
-              <a:rPr lang="en-US" sz="1200" b="0" i="0" u="none" strike="noStrike" kern="1200" dirty="0" smtClean="0">
+              <a:rPr lang="en-US" sz="1200" b="0" i="0" u="none" strike="noStrike" kern="1200" dirty="0">
                 <a:solidFill>
                   <a:schemeClr val="tx1"/>
                 </a:solidFill>
@@ -4002,19 +3932,15 @@
               </a:rPr>
               <a:t> provided by the Operating System and at the process level. Each container is a process or group of processes run in isolation. Typical containers explicitly run only a single process, as they do not need of the standard system services. What they do usually need to do can be provided by system calls to the base OS kernel. </a:t>
             </a:r>
-            <a:endParaRPr lang="en-US" b="0" dirty="0" smtClean="0">
+            <a:endParaRPr lang="en-US" b="0" dirty="0">
               <a:effectLst/>
             </a:endParaRPr>
           </a:p>
           <a:p>
-            <a:r>
-              <a:rPr lang="en-US" dirty="0" smtClean="0"/>
-              <a:t/>
-            </a:r>
             <a:br>
-              <a:rPr lang="en-US" dirty="0" smtClean="0"/>
+              <a:rPr lang="en-US" dirty="0"/>
             </a:br>
-            <a:endParaRPr lang="en-US" baseline="0" dirty="0" smtClean="0"/>
+            <a:endParaRPr lang="en-US" baseline="0" dirty="0"/>
           </a:p>
         </p:txBody>
       </p:sp>
@@ -4100,7 +4026,7 @@
           <a:p>
             <a:pPr rtl="0"/>
             <a:r>
-              <a:rPr lang="en-US" sz="1200" b="0" i="0" u="none" strike="noStrike" kern="1200" dirty="0" smtClean="0">
+              <a:rPr lang="en-US" sz="1200" b="0" i="0" u="none" strike="noStrike" kern="1200" dirty="0">
                 <a:solidFill>
                   <a:schemeClr val="tx1"/>
                 </a:solidFill>
@@ -4112,7 +4038,7 @@
               <a:t>Traditional applications are run on native machines. A single application does not typically use full resources of a single machine. We try to run multiple applications on a single machine to avoid wasting resources. We could run multiple copies of the same application, but to provide isolation we used VMs to run multiple application instances on the same hardware. These VMs have full </a:t>
             </a:r>
             <a:r>
-              <a:rPr lang="en-US" sz="1200" b="0" i="0" u="none" strike="noStrike" kern="1200" dirty="0" err="1" smtClean="0">
+              <a:rPr lang="en-US" sz="1200" b="0" i="0" u="none" strike="noStrike" kern="1200" dirty="0" err="1">
                 <a:solidFill>
                   <a:schemeClr val="tx1"/>
                 </a:solidFill>
@@ -4124,7 +4050,7 @@
               <a:t>oOperating</a:t>
             </a:r>
             <a:r>
-              <a:rPr lang="en-US" sz="1200" b="0" i="0" u="none" strike="noStrike" kern="1200" dirty="0" smtClean="0">
+              <a:rPr lang="en-US" sz="1200" b="0" i="0" u="none" strike="noStrike" kern="1200" dirty="0">
                 <a:solidFill>
                   <a:schemeClr val="tx1"/>
                 </a:solidFill>
@@ -4136,7 +4062,7 @@
               <a:t> </a:t>
             </a:r>
             <a:r>
-              <a:rPr lang="en-US" sz="1200" b="0" i="0" u="none" strike="noStrike" kern="1200" dirty="0" err="1" smtClean="0">
+              <a:rPr lang="en-US" sz="1200" b="0" i="0" u="none" strike="noStrike" kern="1200" dirty="0" err="1">
                 <a:solidFill>
                   <a:schemeClr val="tx1"/>
                 </a:solidFill>
@@ -4148,7 +4074,7 @@
               <a:t>sSystem</a:t>
             </a:r>
             <a:r>
-              <a:rPr lang="en-US" sz="1200" b="0" i="0" u="none" strike="noStrike" kern="1200" dirty="0" smtClean="0">
+              <a:rPr lang="en-US" sz="1200" b="0" i="0" u="none" strike="noStrike" kern="1200" dirty="0">
                 <a:solidFill>
                   <a:schemeClr val="tx1"/>
                 </a:solidFill>
@@ -4159,25 +4085,19 @@
               </a:rPr>
               <a:t> stacks which make them relatively large and inefficient due to duplication both at runtime and on disk.</a:t>
             </a:r>
-            <a:endParaRPr lang="en-US" b="0" dirty="0" smtClean="0">
+            <a:endParaRPr lang="en-US" b="0" dirty="0">
               <a:effectLst/>
             </a:endParaRPr>
           </a:p>
           <a:p>
             <a:pPr rtl="0"/>
-            <a:r>
-              <a:rPr lang="en-US" b="0" dirty="0" smtClean="0">
+            <a:br>
+              <a:rPr lang="en-US" b="0" dirty="0">
                 <a:effectLst/>
               </a:rPr>
-              <a:t/>
-            </a:r>
-            <a:br>
-              <a:rPr lang="en-US" b="0" dirty="0" smtClean="0">
-                <a:effectLst/>
-              </a:rPr>
             </a:br>
             <a:r>
-              <a:rPr lang="en-US" sz="1200" b="0" i="0" u="none" strike="noStrike" kern="1200" dirty="0" smtClean="0">
+              <a:rPr lang="en-US" sz="1200" b="0" i="0" u="none" strike="noStrike" kern="1200" dirty="0">
                 <a:solidFill>
                   <a:schemeClr val="tx1"/>
                 </a:solidFill>
@@ -4188,25 +4108,19 @@
               </a:rPr>
               <a:t>Containers allow you to share the host OS. This reduces duplication while still providing the isolation. </a:t>
             </a:r>
-            <a:endParaRPr lang="en-US" b="0" dirty="0" smtClean="0">
+            <a:endParaRPr lang="en-US" b="0" dirty="0">
               <a:effectLst/>
             </a:endParaRPr>
           </a:p>
           <a:p>
             <a:pPr rtl="0"/>
-            <a:r>
-              <a:rPr lang="en-US" b="0" dirty="0" smtClean="0">
+            <a:br>
+              <a:rPr lang="en-US" b="0" dirty="0">
                 <a:effectLst/>
               </a:rPr>
-              <a:t/>
-            </a:r>
-            <a:br>
-              <a:rPr lang="en-US" b="0" dirty="0" smtClean="0">
-                <a:effectLst/>
-              </a:rPr>
             </a:br>
             <a:r>
-              <a:rPr lang="en-US" sz="1200" b="0" i="0" u="none" strike="noStrike" kern="1200" dirty="0" smtClean="0">
+              <a:rPr lang="en-US" sz="1200" b="0" i="0" u="none" strike="noStrike" kern="1200" dirty="0">
                 <a:solidFill>
                   <a:schemeClr val="tx1"/>
                 </a:solidFill>
@@ -4218,7 +4132,7 @@
               <a:t>Containers allow you to drop unneeded files such as system libraries and binaries to save space, and reduce your attack surface. If </a:t>
             </a:r>
             <a:r>
-              <a:rPr lang="en-US" sz="1200" b="0" i="0" u="none" strike="noStrike" kern="1200" dirty="0" err="1" smtClean="0">
+              <a:rPr lang="en-US" sz="1200" b="0" i="0" u="none" strike="noStrike" kern="1200" dirty="0" err="1">
                 <a:solidFill>
                   <a:schemeClr val="tx1"/>
                 </a:solidFill>
@@ -4230,7 +4144,7 @@
               <a:t>sshd</a:t>
             </a:r>
             <a:r>
-              <a:rPr lang="en-US" sz="1200" b="0" i="0" u="none" strike="noStrike" kern="1200" dirty="0" smtClean="0">
+              <a:rPr lang="en-US" sz="1200" b="0" i="0" u="none" strike="noStrike" kern="1200" dirty="0">
                 <a:solidFill>
                   <a:schemeClr val="tx1"/>
                 </a:solidFill>
@@ -4242,7 +4156,7 @@
               <a:t> or </a:t>
             </a:r>
             <a:r>
-              <a:rPr lang="en-US" sz="1200" b="0" i="0" u="none" strike="noStrike" kern="1200" dirty="0" err="1" smtClean="0">
+              <a:rPr lang="en-US" sz="1200" b="0" i="0" u="none" strike="noStrike" kern="1200" dirty="0" err="1">
                 <a:solidFill>
                   <a:schemeClr val="tx1"/>
                 </a:solidFill>
@@ -4254,7 +4168,7 @@
               <a:t>libc</a:t>
             </a:r>
             <a:r>
-              <a:rPr lang="en-US" sz="1200" b="0" i="0" u="none" strike="noStrike" kern="1200" dirty="0" smtClean="0">
+              <a:rPr lang="en-US" sz="1200" b="0" i="0" u="none" strike="noStrike" kern="1200" dirty="0">
                 <a:solidFill>
                   <a:schemeClr val="tx1"/>
                 </a:solidFill>
@@ -4265,19 +4179,13 @@
               </a:rPr>
               <a:t> is not installed, it cannot be exploited.</a:t>
             </a:r>
-            <a:endParaRPr lang="en-US" b="0" dirty="0" smtClean="0">
+            <a:endParaRPr lang="en-US" b="0" dirty="0">
               <a:effectLst/>
             </a:endParaRPr>
           </a:p>
           <a:p>
-            <a:r>
-              <a:rPr lang="en-US" b="0" dirty="0" smtClean="0">
-                <a:effectLst/>
-              </a:rPr>
-              <a:t/>
-            </a:r>
             <a:br>
-              <a:rPr lang="en-US" b="0" dirty="0" smtClean="0">
+              <a:rPr lang="en-US" b="0" dirty="0">
                 <a:effectLst/>
               </a:rPr>
             </a:br>
@@ -4367,27 +4275,27 @@
           <a:p>
             <a:pPr rtl="0"/>
             <a:r>
-              <a:rPr lang="en-US" dirty="0" smtClean="0"/>
+              <a:rPr lang="en-US" dirty="0"/>
               <a:t>Think</a:t>
             </a:r>
             <a:r>
-              <a:rPr lang="en-US" baseline="0" dirty="0" smtClean="0"/>
+              <a:rPr lang="en-US" baseline="0" dirty="0"/>
               <a:t> about how simple the process that we just described is compared to working in a VM environment. It’s the short list above, vs creating a copy of a disk image and then running through the boot process of an operating system.</a:t>
             </a:r>
-            <a:endParaRPr lang="en-US" dirty="0" smtClean="0"/>
+            <a:endParaRPr lang="en-US" dirty="0"/>
           </a:p>
           <a:p>
             <a:pPr rtl="0"/>
-            <a:endParaRPr lang="en-US" dirty="0" smtClean="0"/>
+            <a:endParaRPr lang="en-US" dirty="0"/>
           </a:p>
           <a:p>
             <a:pPr rtl="0"/>
             <a:r>
-              <a:rPr lang="en-US" dirty="0" smtClean="0"/>
+              <a:rPr lang="en-US" dirty="0"/>
               <a:t>As</a:t>
             </a:r>
             <a:r>
-              <a:rPr lang="en-US" baseline="0" dirty="0" smtClean="0"/>
+              <a:rPr lang="en-US" baseline="0" dirty="0"/>
               <a:t> an example, at IBM we’ve managed to fit thousands of running containers on a host where we could only fit tens or hundreds of VMs.</a:t>
             </a:r>
             <a:endParaRPr lang="en-US" dirty="0"/>
@@ -4475,24 +4383,24 @@
           <a:lstStyle/>
           <a:p>
             <a:r>
-              <a:rPr lang="en-US" dirty="0" smtClean="0"/>
+              <a:rPr lang="en-US" dirty="0"/>
               <a:t>Emphasis on </a:t>
             </a:r>
             <a:r>
-              <a:rPr lang="en-US" dirty="0" err="1" smtClean="0"/>
+              <a:rPr lang="en-US" dirty="0" err="1"/>
               <a:t>docker</a:t>
             </a:r>
             <a:r>
-              <a:rPr lang="en-US" dirty="0" smtClean="0"/>
+              <a:rPr lang="en-US" dirty="0"/>
               <a:t> being a neat tool that makes containers</a:t>
             </a:r>
             <a:r>
-              <a:rPr lang="en-US" baseline="0" dirty="0" smtClean="0"/>
+              <a:rPr lang="en-US" baseline="0" dirty="0"/>
               <a:t> accessible to the end user. </a:t>
             </a:r>
           </a:p>
           <a:p>
-            <a:endParaRPr lang="en-US" baseline="0" dirty="0" smtClean="0"/>
+            <a:endParaRPr lang="en-US" baseline="0" dirty="0"/>
           </a:p>
         </p:txBody>
       </p:sp>
@@ -4662,7 +4570,7 @@
           <a:p>
             <a:pPr rtl="0"/>
             <a:r>
-              <a:rPr lang="en-US" sz="1200" b="0" i="0" u="none" strike="noStrike" kern="1200" dirty="0" smtClean="0">
+              <a:rPr lang="en-US" sz="1200" b="0" i="0" u="none" strike="noStrike" kern="1200" dirty="0">
                 <a:solidFill>
                   <a:schemeClr val="tx1"/>
                 </a:solidFill>
@@ -4674,7 +4582,7 @@
               <a:t>Why: Do you really want to run a single</a:t>
             </a:r>
             <a:r>
-              <a:rPr lang="en-US" sz="1200" b="0" i="0" u="none" strike="noStrike" kern="1200" baseline="0" dirty="0" smtClean="0">
+              <a:rPr lang="en-US" sz="1200" b="0" i="0" u="none" strike="noStrike" kern="1200" baseline="0" dirty="0">
                 <a:solidFill>
                   <a:schemeClr val="tx1"/>
                 </a:solidFill>
@@ -4686,7 +4594,7 @@
               <a:t> instance of your application? Do you like to run many instances among a cluster of machines. Place them, scale up or down, roll out newer versions, </a:t>
             </a:r>
             <a:r>
-              <a:rPr lang="en-US" sz="1200" b="0" i="0" u="none" strike="noStrike" kern="1200" baseline="0" dirty="0" err="1" smtClean="0">
+              <a:rPr lang="en-US" sz="1200" b="0" i="0" u="none" strike="noStrike" kern="1200" baseline="0" dirty="0" err="1">
                 <a:solidFill>
                   <a:schemeClr val="tx1"/>
                 </a:solidFill>
@@ -4698,7 +4606,7 @@
               <a:t>etc</a:t>
             </a:r>
             <a:r>
-              <a:rPr lang="en-US" sz="1200" b="0" i="0" u="none" strike="noStrike" kern="1200" baseline="0" dirty="0" smtClean="0">
+              <a:rPr lang="en-US" sz="1200" b="0" i="0" u="none" strike="noStrike" kern="1200" baseline="0" dirty="0">
                 <a:solidFill>
                   <a:schemeClr val="tx1"/>
                 </a:solidFill>
@@ -4709,7 +4617,7 @@
               </a:rPr>
               <a:t>? We </a:t>
             </a:r>
-            <a:endParaRPr lang="en-US" sz="1200" b="0" i="0" u="none" strike="noStrike" kern="1200" dirty="0" smtClean="0">
+            <a:endParaRPr lang="en-US" sz="1200" b="0" i="0" u="none" strike="noStrike" kern="1200" dirty="0">
               <a:solidFill>
                 <a:schemeClr val="tx1"/>
               </a:solidFill>
@@ -4721,7 +4629,7 @@
           </a:p>
           <a:p>
             <a:pPr rtl="0"/>
-            <a:endParaRPr lang="en-US" sz="1200" b="0" i="0" u="none" strike="noStrike" kern="1200" dirty="0" smtClean="0">
+            <a:endParaRPr lang="en-US" sz="1200" b="0" i="0" u="none" strike="noStrike" kern="1200" dirty="0">
               <a:solidFill>
                 <a:schemeClr val="tx1"/>
               </a:solidFill>
@@ -4734,7 +4642,7 @@
           <a:p>
             <a:pPr rtl="0"/>
             <a:r>
-              <a:rPr lang="en-US" sz="1200" b="0" i="0" u="none" strike="noStrike" kern="1200" dirty="0" smtClean="0">
+              <a:rPr lang="en-US" sz="1200" b="0" i="0" u="none" strike="noStrike" kern="1200" dirty="0">
                 <a:solidFill>
                   <a:schemeClr val="tx1"/>
                 </a:solidFill>
@@ -4743,8 +4651,19 @@
                 <a:ea typeface="+mn-ea"/>
                 <a:cs typeface="+mn-cs"/>
               </a:rPr>
-              <a:t>Now </a:t>
-            </a:r>
+              <a:t>Now that we know what containers are, let us define what Kubernetes is. Kubernetes is a container orchestrator to provision, manage, and scale applications. In other words Kubernetes allows you to manage the lifecycle of containerized applications within a cluster of Nodes.</a:t>
+            </a:r>
+            <a:endParaRPr lang="en-US" b="0" dirty="0">
+              <a:effectLst/>
+            </a:endParaRPr>
+          </a:p>
+          <a:p>
+            <a:pPr rtl="0"/>
+            <a:br>
+              <a:rPr lang="en-US" b="0" dirty="0">
+                <a:effectLst/>
+              </a:rPr>
+            </a:br>
             <a:r>
               <a:rPr lang="en-US" sz="1200" b="0" i="0" u="none" strike="noStrike" kern="1200" dirty="0">
                 <a:solidFill>
@@ -4755,10 +4674,10 @@
                 <a:ea typeface="+mn-ea"/>
                 <a:cs typeface="+mn-cs"/>
               </a:rPr>
-              <a:t>that we know what containers are, let us define what Kubernetes is. Kubernetes is a container orchestrator to provision, manage, and scale applications. In other words Kubernetes allows you to manage the lifecycle of </a:t>
-            </a:r>
-            <a:r>
-              <a:rPr lang="en-US" sz="1200" b="0" i="0" u="none" strike="noStrike" kern="1200" dirty="0" smtClean="0">
+              <a:t>Your applications need many other resources to run such as Volumes, Networks, Secrets that will help you to do things such as connect to databases, talk to firewalled </a:t>
+            </a:r>
+            <a:r>
+              <a:rPr lang="en-US" sz="1200" b="0" i="0" u="none" strike="noStrike" kern="1200" dirty="0" err="1">
                 <a:solidFill>
                   <a:schemeClr val="tx1"/>
                 </a:solidFill>
@@ -4767,7 +4686,7 @@
                 <a:ea typeface="+mn-ea"/>
                 <a:cs typeface="+mn-cs"/>
               </a:rPr>
-              <a:t>containerized </a:t>
+              <a:t>backends</a:t>
             </a:r>
             <a:r>
               <a:rPr lang="en-US" sz="1200" b="0" i="0" u="none" strike="noStrike" kern="1200" dirty="0">
@@ -4779,7 +4698,7 @@
                 <a:ea typeface="+mn-ea"/>
                 <a:cs typeface="+mn-cs"/>
               </a:rPr>
-              <a:t>applications within a cluster of Nodes.</a:t>
+              <a:t>, and secure keys. Kubernetes helps you add these resources into your application.</a:t>
             </a:r>
             <a:endParaRPr lang="en-US" b="0" dirty="0">
               <a:effectLst/>
@@ -4787,17 +4706,6 @@
           </a:p>
           <a:p>
             <a:pPr rtl="0"/>
-            <a:r>
-              <a:rPr lang="en-US" b="0" dirty="0">
-                <a:effectLst/>
-              </a:rPr>
-              <a:t/>
-            </a:r>
-            <a:br>
-              <a:rPr lang="en-US" b="0" dirty="0">
-                <a:effectLst/>
-              </a:rPr>
-            </a:br>
             <a:r>
               <a:rPr lang="en-US" sz="1200" b="0" i="0" u="none" strike="noStrike" kern="1200" dirty="0">
                 <a:solidFill>
@@ -4808,10 +4716,21 @@
                 <a:ea typeface="+mn-ea"/>
                 <a:cs typeface="+mn-cs"/>
               </a:rPr>
-              <a:t>Your applications need many other resources to run such as Volumes, Networks, Secrets that will help you to do things such as connect to databases, talk to firewalled </a:t>
-            </a:r>
-            <a:r>
-              <a:rPr lang="en-US" sz="1200" b="0" i="0" u="none" strike="noStrike" kern="1200" dirty="0" err="1">
+              <a:t>Infrastructure resources needed by applications are managed declaratively.</a:t>
+            </a:r>
+            <a:endParaRPr lang="en-US" b="0" dirty="0">
+              <a:effectLst/>
+            </a:endParaRPr>
+          </a:p>
+          <a:p>
+            <a:pPr rtl="0"/>
+            <a:br>
+              <a:rPr lang="en-US" b="0" dirty="0">
+                <a:effectLst/>
+              </a:rPr>
+            </a:br>
+            <a:r>
+              <a:rPr lang="en-US" sz="1200" b="0" i="0" u="none" strike="noStrike" kern="1200" dirty="0">
                 <a:solidFill>
                   <a:schemeClr val="tx1"/>
                 </a:solidFill>
@@ -4820,10 +4739,10 @@
                 <a:ea typeface="+mn-ea"/>
                 <a:cs typeface="+mn-cs"/>
               </a:rPr>
-              <a:t>backends</a:t>
-            </a:r>
-            <a:r>
-              <a:rPr lang="en-US" sz="1200" b="0" i="0" u="none" strike="noStrike" kern="1200" dirty="0">
+              <a:t>The key paradigm of </a:t>
+            </a:r>
+            <a:r>
+              <a:rPr lang="en-US" sz="1200" b="0" i="0" u="none" strike="noStrike" kern="1200" dirty="0" err="1">
                 <a:solidFill>
                   <a:schemeClr val="tx1"/>
                 </a:solidFill>
@@ -4832,14 +4751,8 @@
                 <a:ea typeface="+mn-ea"/>
                 <a:cs typeface="+mn-cs"/>
               </a:rPr>
-              <a:t>, and secure keys. Kubernetes helps you add these resources into your application.</a:t>
-            </a:r>
-            <a:endParaRPr lang="en-US" b="0" dirty="0">
-              <a:effectLst/>
-            </a:endParaRPr>
-          </a:p>
-          <a:p>
-            <a:pPr rtl="0"/>
+              <a:t>kubernetes</a:t>
+            </a:r>
             <a:r>
               <a:rPr lang="en-US" sz="1200" b="0" i="0" u="none" strike="noStrike" kern="1200" dirty="0">
                 <a:solidFill>
@@ -4850,7 +4763,7 @@
                 <a:ea typeface="+mn-ea"/>
                 <a:cs typeface="+mn-cs"/>
               </a:rPr>
-              <a:t>Infrastructure resources needed by applications are managed declaratively.</a:t>
+              <a:t> is it’s Declarative model. The user provides the "desired state" and Kubernetes will make it happen. If you need 5 instances, you do not start 5 separate instances on your own but rather tell Kubernetes that you need 5 instances and Kubernetes will reconcile the state automatically. Simply at this point you need to know that you declare the state you want and Kubernetes make that happen, if something goes wrong with one of your instances and it crashes, Kubernetes still knows the desired state and restores the crashed instance on an available node.</a:t>
             </a:r>
             <a:endParaRPr lang="en-US" b="0" dirty="0">
               <a:effectLst/>
@@ -4858,12 +4771,6 @@
           </a:p>
           <a:p>
             <a:pPr rtl="0"/>
-            <a:r>
-              <a:rPr lang="en-US" b="0" dirty="0">
-                <a:effectLst/>
-              </a:rPr>
-              <a:t/>
-            </a:r>
             <a:br>
               <a:rPr lang="en-US" b="0" dirty="0">
                 <a:effectLst/>
@@ -4879,7 +4786,7 @@
                 <a:ea typeface="+mn-ea"/>
                 <a:cs typeface="+mn-cs"/>
               </a:rPr>
-              <a:t>The key paradigm of </a:t>
+              <a:t>Kubernetes goes by many names. Sometimes it is shortened to k8s (losing the internal 8 letters), or </a:t>
             </a:r>
             <a:r>
               <a:rPr lang="en-US" sz="1200" b="0" i="0" u="none" strike="noStrike" kern="1200" dirty="0" err="1">
@@ -4891,7 +4798,7 @@
                 <a:ea typeface="+mn-ea"/>
                 <a:cs typeface="+mn-cs"/>
               </a:rPr>
-              <a:t>kubernetes</a:t>
+              <a:t>kube</a:t>
             </a:r>
             <a:r>
               <a:rPr lang="en-US" sz="1200" b="0" i="0" u="none" strike="noStrike" kern="1200" dirty="0">
@@ -4903,27 +4810,10 @@
                 <a:ea typeface="+mn-ea"/>
                 <a:cs typeface="+mn-cs"/>
               </a:rPr>
-              <a:t> is it’s Declarative model. The user provides the "desired state" and Kubernetes will make it happen. If you need 5 instances, you do not start 5 separate instances on your own but rather tell Kubernetes that you need 5 instances and Kubernetes will reconcile the state automatically. Simply at this point you need to know that you declare the state you want and Kubernetes make that happen, if something goes wrong with one of your instances and it crashes, Kubernetes still knows the desired state and restores the crashed instance on an available node.</a:t>
-            </a:r>
-            <a:endParaRPr lang="en-US" b="0" dirty="0">
-              <a:effectLst/>
-            </a:endParaRPr>
-          </a:p>
-          <a:p>
-            <a:pPr rtl="0"/>
-            <a:r>
-              <a:rPr lang="en-US" b="0" dirty="0">
-                <a:effectLst/>
-              </a:rPr>
-              <a:t/>
-            </a:r>
-            <a:br>
-              <a:rPr lang="en-US" b="0" dirty="0">
-                <a:effectLst/>
-              </a:rPr>
-            </a:br>
-            <a:r>
-              <a:rPr lang="en-US" sz="1200" b="0" i="0" u="none" strike="noStrike" kern="1200" dirty="0">
+              <a:t>. The word is rooted in ancient </a:t>
+            </a:r>
+            <a:r>
+              <a:rPr lang="en-US" sz="1200" b="0" i="0" u="none" strike="noStrike" kern="1200" dirty="0" err="1">
                 <a:solidFill>
                   <a:schemeClr val="tx1"/>
                 </a:solidFill>
@@ -4932,10 +4822,10 @@
                 <a:ea typeface="+mn-ea"/>
                 <a:cs typeface="+mn-cs"/>
               </a:rPr>
-              <a:t>Kubernetes goes by many names. Sometimes it is shortened to k8s (losing the internal 8 letters), or </a:t>
-            </a:r>
-            <a:r>
-              <a:rPr lang="en-US" sz="1200" b="0" i="0" u="none" strike="noStrike" kern="1200" dirty="0" err="1">
+              <a:t>greek</a:t>
+            </a:r>
+            <a:r>
+              <a:rPr lang="en-US" sz="1200" b="0" i="0" u="none" strike="noStrike" kern="1200" dirty="0">
                 <a:solidFill>
                   <a:schemeClr val="tx1"/>
                 </a:solidFill>
@@ -4944,42 +4834,6 @@
                 <a:ea typeface="+mn-ea"/>
                 <a:cs typeface="+mn-cs"/>
               </a:rPr>
-              <a:t>kube</a:t>
-            </a:r>
-            <a:r>
-              <a:rPr lang="en-US" sz="1200" b="0" i="0" u="none" strike="noStrike" kern="1200" dirty="0">
-                <a:solidFill>
-                  <a:schemeClr val="tx1"/>
-                </a:solidFill>
-                <a:effectLst/>
-                <a:latin typeface="+mn-lt"/>
-                <a:ea typeface="+mn-ea"/>
-                <a:cs typeface="+mn-cs"/>
-              </a:rPr>
-              <a:t>. The word is rooted in ancient </a:t>
-            </a:r>
-            <a:r>
-              <a:rPr lang="en-US" sz="1200" b="0" i="0" u="none" strike="noStrike" kern="1200" dirty="0" err="1">
-                <a:solidFill>
-                  <a:schemeClr val="tx1"/>
-                </a:solidFill>
-                <a:effectLst/>
-                <a:latin typeface="+mn-lt"/>
-                <a:ea typeface="+mn-ea"/>
-                <a:cs typeface="+mn-cs"/>
-              </a:rPr>
-              <a:t>greek</a:t>
-            </a:r>
-            <a:r>
-              <a:rPr lang="en-US" sz="1200" b="0" i="0" u="none" strike="noStrike" kern="1200" dirty="0">
-                <a:solidFill>
-                  <a:schemeClr val="tx1"/>
-                </a:solidFill>
-                <a:effectLst/>
-                <a:latin typeface="+mn-lt"/>
-                <a:ea typeface="+mn-ea"/>
-                <a:cs typeface="+mn-cs"/>
-              </a:rPr>
               <a:t> and means "Helmsman". A helmsman is the person who steers a ship. We hope you can seen the analogy between directing a ship and the decisions made to orchestrate containers on a cluster.</a:t>
             </a:r>
             <a:endParaRPr lang="en-US" b="0" dirty="0">
@@ -4987,10 +4841,6 @@
             </a:endParaRPr>
           </a:p>
           <a:p>
-            <a:r>
-              <a:rPr lang="en-US" dirty="0"/>
-              <a:t/>
-            </a:r>
             <a:br>
               <a:rPr lang="en-US" dirty="0"/>
             </a:br>
@@ -5121,12 +4971,6 @@
           </a:p>
           <a:p>
             <a:pPr rtl="0"/>
-            <a:r>
-              <a:rPr lang="en-US" b="0" dirty="0">
-                <a:effectLst/>
-              </a:rPr>
-              <a:t/>
-            </a:r>
             <a:br>
               <a:rPr lang="en-US" b="0" dirty="0">
                 <a:effectLst/>
@@ -5149,10 +4993,6 @@
             </a:endParaRPr>
           </a:p>
           <a:p>
-            <a:r>
-              <a:rPr lang="en-US" dirty="0"/>
-              <a:t/>
-            </a:r>
             <a:br>
               <a:rPr lang="en-US" dirty="0"/>
             </a:br>
@@ -5325,7 +5165,7 @@
           <a:p>
             <a:fld id="{9564BD44-9ED7-6744-A12F-3CD373F188E6}" type="datetime1">
               <a:rPr lang="en-US" smtClean="0"/>
-              <a:t>3/28/18</a:t>
+              <a:t>4/11/2018</a:t>
             </a:fld>
             <a:endParaRPr lang="en-US"/>
           </a:p>
@@ -5581,7 +5421,7 @@
           <a:p>
             <a:fld id="{43B2E437-D25F-904D-B749-4AC8A14AAE67}" type="datetime1">
               <a:rPr lang="en-US" smtClean="0"/>
-              <a:t>3/28/18</a:t>
+              <a:t>4/11/2018</a:t>
             </a:fld>
             <a:endParaRPr lang="en-US"/>
           </a:p>
@@ -5749,7 +5589,7 @@
           <a:p>
             <a:fld id="{846D04EA-8894-0C4E-A96C-33E58E1FD5B9}" type="datetime1">
               <a:rPr lang="en-US" smtClean="0"/>
-              <a:t>3/28/18</a:t>
+              <a:t>4/11/2018</a:t>
             </a:fld>
             <a:endParaRPr lang="en-US"/>
           </a:p>
@@ -5927,7 +5767,7 @@
           <a:p>
             <a:fld id="{E1560804-0135-6347-9F37-DD0AC3C4B575}" type="datetime1">
               <a:rPr lang="en-US" smtClean="0"/>
-              <a:t>3/28/18</a:t>
+              <a:t>4/11/2018</a:t>
             </a:fld>
             <a:endParaRPr lang="en-US"/>
           </a:p>
@@ -6048,14 +5888,14 @@
           </a:ln>
           <a:extLst>
             <a:ext uri="{909E8E84-426E-40dd-AFC4-6F175D3DCCD1}">
-              <a14:hiddenFill xmlns="" xmlns:a14="http://schemas.microsoft.com/office/drawing/2010/main">
+              <a14:hiddenFill xmlns:a14="http://schemas.microsoft.com/office/drawing/2010/main" xmlns="">
                 <a:solidFill>
                   <a:srgbClr val="FFFFFF"/>
                 </a:solidFill>
               </a14:hiddenFill>
             </a:ext>
             <a:ext uri="{91240B29-F687-4f45-9708-019B960494DF}">
-              <a14:hiddenLine xmlns="" xmlns:a14="http://schemas.microsoft.com/office/drawing/2010/main" w="9525">
+              <a14:hiddenLine xmlns:a14="http://schemas.microsoft.com/office/drawing/2010/main" xmlns="" w="9525">
                 <a:solidFill>
                   <a:srgbClr val="000000"/>
                 </a:solidFill>
@@ -6102,14 +5942,14 @@
           </a:ln>
           <a:extLst>
             <a:ext uri="{909E8E84-426E-40dd-AFC4-6F175D3DCCD1}">
-              <a14:hiddenFill xmlns="" xmlns:a14="http://schemas.microsoft.com/office/drawing/2010/main">
+              <a14:hiddenFill xmlns:a14="http://schemas.microsoft.com/office/drawing/2010/main" xmlns="">
                 <a:solidFill>
                   <a:srgbClr val="FFFFFF"/>
                 </a:solidFill>
               </a14:hiddenFill>
             </a:ext>
             <a:ext uri="{91240B29-F687-4f45-9708-019B960494DF}">
-              <a14:hiddenLine xmlns="" xmlns:a14="http://schemas.microsoft.com/office/drawing/2010/main" w="9525">
+              <a14:hiddenLine xmlns:a14="http://schemas.microsoft.com/office/drawing/2010/main" xmlns="" w="9525">
                 <a:solidFill>
                   <a:srgbClr val="000000"/>
                 </a:solidFill>
@@ -6156,14 +5996,14 @@
           </a:ln>
           <a:extLst>
             <a:ext uri="{909E8E84-426E-40dd-AFC4-6F175D3DCCD1}">
-              <a14:hiddenFill xmlns="" xmlns:a14="http://schemas.microsoft.com/office/drawing/2010/main">
+              <a14:hiddenFill xmlns:a14="http://schemas.microsoft.com/office/drawing/2010/main" xmlns="">
                 <a:solidFill>
                   <a:srgbClr val="FFFFFF"/>
                 </a:solidFill>
               </a14:hiddenFill>
             </a:ext>
             <a:ext uri="{91240B29-F687-4f45-9708-019B960494DF}">
-              <a14:hiddenLine xmlns="" xmlns:a14="http://schemas.microsoft.com/office/drawing/2010/main" w="9525">
+              <a14:hiddenLine xmlns:a14="http://schemas.microsoft.com/office/drawing/2010/main" xmlns="" w="9525">
                 <a:solidFill>
                   <a:srgbClr val="000000"/>
                 </a:solidFill>
@@ -6394,7 +6234,7 @@
           <a:p>
             <a:fld id="{F96B7D31-5740-2540-960E-830772103504}" type="datetime1">
               <a:rPr lang="en-US" smtClean="0"/>
-              <a:t>3/28/18</a:t>
+              <a:t>4/11/2018</a:t>
             </a:fld>
             <a:endParaRPr lang="en-US"/>
           </a:p>
@@ -6586,7 +6426,7 @@
           <a:p>
             <a:fld id="{F96B7D31-5740-2540-960E-830772103504}" type="datetime1">
               <a:rPr lang="en-US" smtClean="0"/>
-              <a:t>3/28/18</a:t>
+              <a:t>4/11/2018</a:t>
             </a:fld>
             <a:endParaRPr lang="en-US"/>
           </a:p>
@@ -6831,7 +6671,7 @@
           <a:p>
             <a:fld id="{77EC05AD-9AC1-8446-A891-E4BC6F95154C}" type="datetime1">
               <a:rPr lang="en-US" smtClean="0"/>
-              <a:t>3/28/18</a:t>
+              <a:t>4/11/2018</a:t>
             </a:fld>
             <a:endParaRPr lang="en-US"/>
           </a:p>
@@ -7060,7 +6900,7 @@
           <a:p>
             <a:fld id="{DE4D9D6A-AB2F-ED4A-9D2B-3CFA16DBB150}" type="datetime1">
               <a:rPr lang="en-US" smtClean="0"/>
-              <a:t>3/28/18</a:t>
+              <a:t>4/11/2018</a:t>
             </a:fld>
             <a:endParaRPr lang="en-US"/>
           </a:p>
@@ -7397,7 +7237,7 @@
           <a:p>
             <a:fld id="{0ACF4E32-9DFF-F54A-A4F0-10CAAEC3737C}" type="datetime1">
               <a:rPr lang="en-US" smtClean="0"/>
-              <a:t>3/28/18</a:t>
+              <a:t>4/11/2018</a:t>
             </a:fld>
             <a:endParaRPr lang="en-US"/>
           </a:p>
@@ -7450,7 +7290,7 @@
           <p:cNvPr id="10" name="Title Placeholder 1">
             <a:extLst>
               <a:ext uri="{FF2B5EF4-FFF2-40B4-BE49-F238E27FC236}">
-                <a16:creationId xmlns="" xmlns:a16="http://schemas.microsoft.com/office/drawing/2014/main" id="{33FCD51B-D8B8-1B46-AEF0-8AB97D949B7C}"/>
+                <a16:creationId xmlns:a16="http://schemas.microsoft.com/office/drawing/2014/main" id="{33FCD51B-D8B8-1B46-AEF0-8AB97D949B7C}"/>
               </a:ext>
             </a:extLst>
           </p:cNvPr>
@@ -7552,7 +7392,7 @@
           <a:p>
             <a:fld id="{6FD436D8-76DC-4C48-B223-3722A1528131}" type="datetime1">
               <a:rPr lang="en-US" smtClean="0"/>
-              <a:t>3/28/18</a:t>
+              <a:t>4/11/2018</a:t>
             </a:fld>
             <a:endParaRPr lang="en-US"/>
           </a:p>
@@ -7647,7 +7487,7 @@
           <a:p>
             <a:fld id="{9183B1C4-DA41-6E4A-A890-D17D6ADE85A2}" type="datetime1">
               <a:rPr lang="en-US" smtClean="0"/>
-              <a:t>3/28/18</a:t>
+              <a:t>4/11/2018</a:t>
             </a:fld>
             <a:endParaRPr lang="en-US"/>
           </a:p>
@@ -7922,7 +7762,7 @@
           <a:p>
             <a:fld id="{9839626B-35B3-0843-BA5F-60AC1169B3F2}" type="datetime1">
               <a:rPr lang="en-US" smtClean="0"/>
-              <a:t>3/28/18</a:t>
+              <a:t>4/11/2018</a:t>
             </a:fld>
             <a:endParaRPr lang="en-US"/>
           </a:p>
@@ -8010,7 +7850,7 @@
           <p:cNvPr id="7" name="Rectangle 6">
             <a:extLst>
               <a:ext uri="{FF2B5EF4-FFF2-40B4-BE49-F238E27FC236}">
-                <a16:creationId xmlns="" xmlns:a16="http://schemas.microsoft.com/office/drawing/2014/main" id="{10F9AD12-580D-CC44-8CCE-50BC78237E4C}"/>
+                <a16:creationId xmlns:a16="http://schemas.microsoft.com/office/drawing/2014/main" id="{10F9AD12-580D-CC44-8CCE-50BC78237E4C}"/>
               </a:ext>
             </a:extLst>
           </p:cNvPr>
@@ -8190,7 +8030,7 @@
           <a:p>
             <a:fld id="{CA6D735F-2293-754C-9C95-4FF5C0C5987C}" type="datetime1">
               <a:rPr lang="en-US" smtClean="0"/>
-              <a:t>3/28/18</a:t>
+              <a:t>4/11/2018</a:t>
             </a:fld>
             <a:endParaRPr lang="en-US"/>
           </a:p>
@@ -8279,7 +8119,7 @@
           <p:cNvPr id="8" name="Hexagon 7">
             <a:extLst>
               <a:ext uri="{FF2B5EF4-FFF2-40B4-BE49-F238E27FC236}">
-                <a16:creationId xmlns="" xmlns:a16="http://schemas.microsoft.com/office/drawing/2014/main" id="{24E608F0-3106-1541-9ED2-87A6BF127CA3}"/>
+                <a16:creationId xmlns:a16="http://schemas.microsoft.com/office/drawing/2014/main" id="{24E608F0-3106-1541-9ED2-87A6BF127CA3}"/>
               </a:ext>
             </a:extLst>
           </p:cNvPr>
@@ -8341,7 +8181,7 @@
           <p:cNvPr id="10" name="Picture 9">
             <a:extLst>
               <a:ext uri="{FF2B5EF4-FFF2-40B4-BE49-F238E27FC236}">
-                <a16:creationId xmlns="" xmlns:a16="http://schemas.microsoft.com/office/drawing/2014/main" id="{8AD54A47-9789-CD4C-B662-BC021B8D092B}"/>
+                <a16:creationId xmlns:a16="http://schemas.microsoft.com/office/drawing/2014/main" id="{8AD54A47-9789-CD4C-B662-BC021B8D092B}"/>
               </a:ext>
             </a:extLst>
           </p:cNvPr>
@@ -12502,7 +12342,9 @@
         </p:nvSpPr>
         <p:spPr/>
         <p:txBody>
-          <a:bodyPr/>
+          <a:bodyPr vert="horz" lIns="91440" tIns="45720" rIns="91440" bIns="45720" rtlCol="0" anchor="t">
+            <a:normAutofit/>
+          </a:bodyPr>
           <a:lstStyle/>
           <a:p>
             <a:r>
@@ -12513,20 +12355,11 @@
           <a:p>
             <a:r>
               <a:rPr lang="en-US" dirty="0"/>
-              <a:t>Build a Docker image for the application</a:t>
-            </a:r>
-          </a:p>
-          <a:p>
-            <a:r>
-              <a:rPr lang="en-US" dirty="0"/>
-              <a:t>Setup access to your registry</a:t>
-            </a:r>
-          </a:p>
-          <a:p>
-            <a:r>
-              <a:rPr lang="en-US" dirty="0"/>
-              <a:t>Store the image in a repository</a:t>
-            </a:r>
+              <a:t>Get the image from a registry</a:t>
+            </a:r>
+            <a:endParaRPr lang="en-US" dirty="0">
+              <a:cs typeface="Calibri"/>
+            </a:endParaRPr>
           </a:p>
           <a:p>
             <a:r>
@@ -12600,7 +12433,7 @@
           <p:cNvPr id="2" name="Title 1">
             <a:extLst>
               <a:ext uri="{FF2B5EF4-FFF2-40B4-BE49-F238E27FC236}">
-                <a16:creationId xmlns="" xmlns:a16="http://schemas.microsoft.com/office/drawing/2014/main" id="{544F55A6-A7DF-B443-8929-2510EE1AA158}"/>
+                <a16:creationId xmlns:a16="http://schemas.microsoft.com/office/drawing/2014/main" id="{544F55A6-A7DF-B443-8929-2510EE1AA158}"/>
               </a:ext>
             </a:extLst>
           </p:cNvPr>
@@ -12628,7 +12461,7 @@
           <p:cNvPr id="3" name="Content Placeholder 2">
             <a:extLst>
               <a:ext uri="{FF2B5EF4-FFF2-40B4-BE49-F238E27FC236}">
-                <a16:creationId xmlns="" xmlns:a16="http://schemas.microsoft.com/office/drawing/2014/main" id="{232A4CBC-2560-E04A-8ED9-871EB5A30604}"/>
+                <a16:creationId xmlns:a16="http://schemas.microsoft.com/office/drawing/2014/main" id="{232A4CBC-2560-E04A-8ED9-871EB5A30604}"/>
               </a:ext>
             </a:extLst>
           </p:cNvPr>
@@ -12710,7 +12543,7 @@
           <p:cNvPr id="4" name="Slide Number Placeholder 3">
             <a:extLst>
               <a:ext uri="{FF2B5EF4-FFF2-40B4-BE49-F238E27FC236}">
-                <a16:creationId xmlns="" xmlns:a16="http://schemas.microsoft.com/office/drawing/2014/main" id="{2ED68830-F272-FF4A-BF26-6D7569CE12E2}"/>
+                <a16:creationId xmlns:a16="http://schemas.microsoft.com/office/drawing/2014/main" id="{2ED68830-F272-FF4A-BF26-6D7569CE12E2}"/>
               </a:ext>
             </a:extLst>
           </p:cNvPr>
@@ -12783,7 +12616,7 @@
           <a:p>
             <a:r>
               <a:rPr lang="en-US" dirty="0"/>
-              <a:t>Build a Docker image for the application</a:t>
+              <a:t>Store the image in a repository - Demo</a:t>
             </a:r>
           </a:p>
         </p:txBody>
@@ -12800,135 +12633,47 @@
         </p:nvSpPr>
         <p:spPr/>
         <p:txBody>
-          <a:bodyPr>
+          <a:bodyPr vert="horz" lIns="91440" tIns="45720" rIns="91440" bIns="45720" rtlCol="0" anchor="t">
             <a:normAutofit/>
           </a:bodyPr>
           <a:lstStyle/>
           <a:p>
-            <a:pPr defTabSz="357353">
-              <a:defRPr sz="2784" b="1">
-                <a:latin typeface="Helvetica"/>
-                <a:ea typeface="Helvetica"/>
-                <a:cs typeface="Helvetica"/>
-                <a:sym typeface="Helvetica"/>
-              </a:defRPr>
-            </a:pPr>
-            <a:r>
-              <a:rPr lang="en-US" dirty="0"/>
-              <a:t>`</a:t>
+            <a:endParaRPr lang="en-US" dirty="0"/>
+          </a:p>
+          <a:p>
+            <a:r>
+              <a:rPr lang="en-US" dirty="0"/>
+              <a:t>Get the docker image</a:t>
+            </a:r>
+          </a:p>
+          <a:p>
+            <a:endParaRPr lang="en-US" dirty="0"/>
+          </a:p>
+          <a:p>
+            <a:r>
+              <a:rPr lang="en-US" dirty="0"/>
+              <a:t>Test the image using docker/</a:t>
             </a:r>
             <a:r>
               <a:rPr lang="en-US" dirty="0" err="1"/>
-              <a:t>docker</a:t>
-            </a:r>
-            <a:r>
-              <a:rPr lang="en-US" dirty="0"/>
-              <a:t>` is the CLI we use to execute </a:t>
-            </a:r>
-            <a:r>
-              <a:rPr lang="en-US" dirty="0" err="1"/>
-              <a:t>docker</a:t>
-            </a:r>
-            <a:r>
-              <a:rPr lang="en-US" dirty="0"/>
-              <a:t> commands</a:t>
-            </a:r>
-          </a:p>
-          <a:p>
-            <a:pPr defTabSz="357353">
-              <a:defRPr sz="2784" b="1">
-                <a:latin typeface="Helvetica"/>
-                <a:ea typeface="Helvetica"/>
-                <a:cs typeface="Helvetica"/>
-                <a:sym typeface="Helvetica"/>
-              </a:defRPr>
-            </a:pPr>
+              <a:t>kubectl</a:t>
+            </a:r>
             <a:endParaRPr lang="en-US" dirty="0"/>
           </a:p>
           <a:p>
-            <a:pPr defTabSz="357353">
-              <a:defRPr sz="2784" b="1">
-                <a:latin typeface="Helvetica"/>
-                <a:ea typeface="Helvetica"/>
-                <a:cs typeface="Helvetica"/>
-                <a:sym typeface="Helvetica"/>
-              </a:defRPr>
-            </a:pPr>
-            <a:r>
-              <a:rPr lang="en-US" dirty="0"/>
-              <a:t>Image is a tar/zip of a filesystem that is capable of running  your application on top of your favorite kernel.</a:t>
-            </a:r>
-          </a:p>
-          <a:p>
-            <a:pPr defTabSz="357353">
-              <a:defRPr sz="2784" b="1">
-                <a:latin typeface="Helvetica"/>
-                <a:ea typeface="Helvetica"/>
-                <a:cs typeface="Helvetica"/>
-                <a:sym typeface="Helvetica"/>
-              </a:defRPr>
-            </a:pPr>
-            <a:r>
-              <a:rPr lang="en-US" dirty="0"/>
-              <a:t>`</a:t>
-            </a:r>
-            <a:r>
-              <a:rPr lang="en-US" dirty="0" err="1"/>
-              <a:t>docker</a:t>
-            </a:r>
-            <a:r>
-              <a:rPr lang="en-US" dirty="0"/>
-              <a:t> build` builds </a:t>
-            </a:r>
-            <a:r>
-              <a:rPr lang="en-US" dirty="0" err="1"/>
-              <a:t>docker</a:t>
-            </a:r>
-            <a:r>
-              <a:rPr lang="en-US" dirty="0"/>
-              <a:t> images from </a:t>
-            </a:r>
-            <a:r>
-              <a:rPr lang="en-US" dirty="0" err="1"/>
-              <a:t>Dockerfile</a:t>
-            </a:r>
-            <a:r>
-              <a:rPr lang="en-US" dirty="0"/>
-              <a:t>. </a:t>
-            </a:r>
-          </a:p>
-          <a:p>
-            <a:pPr defTabSz="357353">
-              <a:defRPr sz="2784" b="1">
-                <a:latin typeface="Helvetica"/>
-                <a:ea typeface="Helvetica"/>
-                <a:cs typeface="Helvetica"/>
-                <a:sym typeface="Helvetica"/>
-              </a:defRPr>
-            </a:pPr>
             <a:endParaRPr lang="en-US" dirty="0"/>
           </a:p>
           <a:p>
-            <a:pPr defTabSz="357353">
-              <a:defRPr sz="2784" b="1">
-                <a:latin typeface="Helvetica"/>
-                <a:ea typeface="Helvetica"/>
-                <a:cs typeface="Helvetica"/>
-                <a:sym typeface="Helvetica"/>
-              </a:defRPr>
-            </a:pPr>
-            <a:r>
-              <a:rPr lang="en-US" dirty="0"/>
-              <a:t>`</a:t>
-            </a:r>
-            <a:r>
-              <a:rPr lang="en-US" dirty="0" err="1"/>
-              <a:t>docker</a:t>
-            </a:r>
-            <a:r>
-              <a:rPr lang="en-US" dirty="0"/>
-              <a:t> build -t [tag]  .</a:t>
-            </a:r>
+            <a:endParaRPr lang="en-US" dirty="0"/>
+          </a:p>
+          <a:p>
+            <a:endParaRPr lang="en-US" dirty="0"/>
+          </a:p>
+          <a:p>
+            <a:endParaRPr lang="en-US" dirty="0"/>
+          </a:p>
+          <a:p>
+            <a:endParaRPr lang="en-US" dirty="0"/>
           </a:p>
         </p:txBody>
       </p:sp>
@@ -12955,56 +12700,10 @@
           </a:p>
         </p:txBody>
       </p:sp>
-      <p:pic>
-        <p:nvPicPr>
-          <p:cNvPr id="5" name="Picture 4"/>
-          <p:cNvPicPr>
-            <a:picLocks noChangeAspect="1"/>
-          </p:cNvPicPr>
-          <p:nvPr/>
-        </p:nvPicPr>
-        <p:blipFill>
-          <a:blip r:embed="rId3">
-            <a:extLst>
-              <a:ext uri="{BEBA8EAE-BF5A-486C-A8C5-ECC9F3942E4B}">
-                <a14:imgProps xmlns:a14="http://schemas.microsoft.com/office/drawing/2010/main">
-                  <a14:imgLayer r:embed="rId4">
-                    <a14:imgEffect>
-                      <a14:artisticMosiaicBubbles trans="55000" pressure="0"/>
-                    </a14:imgEffect>
-                  </a14:imgLayer>
-                </a14:imgProps>
-              </a:ext>
-              <a:ext uri="{28A0092B-C50C-407E-A947-70E740481C1C}">
-                <a14:useLocalDpi xmlns:a14="http://schemas.microsoft.com/office/drawing/2010/main" val="0"/>
-              </a:ext>
-            </a:extLst>
-          </a:blip>
-          <a:stretch>
-            <a:fillRect/>
-          </a:stretch>
-        </p:blipFill>
-        <p:spPr>
-          <a:xfrm>
-            <a:off x="6073113" y="3886200"/>
-            <a:ext cx="4987052" cy="2281073"/>
-          </a:xfrm>
-          <a:prstGeom prst="rect">
-            <a:avLst/>
-          </a:prstGeom>
-          <a:effectLst>
-            <a:outerShdw blurRad="50800" dist="50800" dir="5400000" algn="ctr" rotWithShape="0">
-              <a:schemeClr val="bg2">
-                <a:alpha val="94000"/>
-              </a:schemeClr>
-            </a:outerShdw>
-          </a:effectLst>
-        </p:spPr>
-      </p:pic>
     </p:spTree>
     <p:extLst>
       <p:ext uri="{BB962C8B-B14F-4D97-AF65-F5344CB8AC3E}">
-        <p14:creationId xmlns:p14="http://schemas.microsoft.com/office/powerpoint/2010/main" val="1218579122"/>
+        <p14:creationId xmlns:p14="http://schemas.microsoft.com/office/powerpoint/2010/main" val="3934580896"/>
       </p:ext>
     </p:extLst>
   </p:cSld>
@@ -13044,46 +12743,46 @@
         <p:spPr/>
         <p:txBody>
           <a:bodyPr>
+            <a:normAutofit fontScale="90000"/>
+          </a:bodyPr>
+          <a:lstStyle/>
+          <a:p>
+            <a:r>
+              <a:rPr lang="en-US" dirty="0"/>
+              <a:t>Deploy the application to Kubernetes cluster - Demo</a:t>
+            </a:r>
+          </a:p>
+        </p:txBody>
+      </p:sp>
+      <p:sp>
+        <p:nvSpPr>
+          <p:cNvPr id="3" name="Content Placeholder 2"/>
+          <p:cNvSpPr>
+            <a:spLocks noGrp="1"/>
+          </p:cNvSpPr>
+          <p:nvPr>
+            <p:ph idx="1"/>
+          </p:nvPr>
+        </p:nvSpPr>
+        <p:spPr/>
+        <p:txBody>
+          <a:bodyPr>
             <a:normAutofit/>
           </a:bodyPr>
           <a:lstStyle/>
           <a:p>
             <a:r>
               <a:rPr lang="en-US" dirty="0"/>
-              <a:t>Store the image in a repository - Demo</a:t>
-            </a:r>
-          </a:p>
-        </p:txBody>
-      </p:sp>
-      <p:sp>
-        <p:nvSpPr>
-          <p:cNvPr id="3" name="Content Placeholder 2"/>
-          <p:cNvSpPr>
-            <a:spLocks noGrp="1"/>
-          </p:cNvSpPr>
-          <p:nvPr>
-            <p:ph idx="1"/>
-          </p:nvPr>
-        </p:nvSpPr>
-        <p:spPr/>
-        <p:txBody>
-          <a:bodyPr/>
-          <a:lstStyle/>
+              <a:t>Deploy the Application</a:t>
+            </a:r>
+          </a:p>
           <a:p>
             <a:endParaRPr lang="en-US" dirty="0"/>
           </a:p>
           <a:p>
             <a:r>
               <a:rPr lang="en-US" dirty="0"/>
-              <a:t>Build the </a:t>
-            </a:r>
-            <a:r>
-              <a:rPr lang="en-US" dirty="0" err="1"/>
-              <a:t>docker</a:t>
-            </a:r>
-            <a:r>
-              <a:rPr lang="en-US" dirty="0"/>
-              <a:t> image</a:t>
+              <a:t>Run the Application</a:t>
             </a:r>
           </a:p>
           <a:p>
@@ -13092,56 +12791,8 @@
           <a:p>
             <a:r>
               <a:rPr lang="en-US" dirty="0"/>
-              <a:t>Test the image using </a:t>
-            </a:r>
-            <a:r>
-              <a:rPr lang="en-US" dirty="0" err="1"/>
-              <a:t>docker</a:t>
-            </a:r>
-            <a:r>
-              <a:rPr lang="en-US" dirty="0"/>
-              <a:t>/</a:t>
-            </a:r>
-            <a:r>
-              <a:rPr lang="en-US" dirty="0" err="1"/>
-              <a:t>kubectl</a:t>
-            </a:r>
-            <a:endParaRPr lang="en-US" dirty="0"/>
-          </a:p>
-          <a:p>
-            <a:endParaRPr lang="en-US" dirty="0"/>
-          </a:p>
-          <a:p>
-            <a:r>
-              <a:rPr lang="en-US" dirty="0"/>
-              <a:t>Push the image to the </a:t>
-            </a:r>
-            <a:r>
-              <a:rPr lang="en-US" dirty="0" err="1"/>
-              <a:t>docker</a:t>
-            </a:r>
-            <a:r>
-              <a:rPr lang="en-US" dirty="0"/>
-              <a:t> registry </a:t>
-            </a:r>
-          </a:p>
-          <a:p>
-            <a:endParaRPr lang="en-US" dirty="0"/>
-          </a:p>
-          <a:p>
-            <a:r>
-              <a:rPr lang="en-US" dirty="0"/>
-              <a:t>Check the image in the repository</a:t>
-            </a:r>
-          </a:p>
-          <a:p>
-            <a:endParaRPr lang="en-US" dirty="0"/>
-          </a:p>
-          <a:p>
-            <a:endParaRPr lang="en-US" dirty="0"/>
-          </a:p>
-          <a:p>
-            <a:endParaRPr lang="en-US" dirty="0"/>
+              <a:t>Check if application is running </a:t>
+            </a:r>
           </a:p>
           <a:p>
             <a:endParaRPr lang="en-US" dirty="0"/>
@@ -13174,7 +12825,7 @@
     </p:spTree>
     <p:extLst>
       <p:ext uri="{BB962C8B-B14F-4D97-AF65-F5344CB8AC3E}">
-        <p14:creationId xmlns:p14="http://schemas.microsoft.com/office/powerpoint/2010/main" val="3934580896"/>
+        <p14:creationId xmlns:p14="http://schemas.microsoft.com/office/powerpoint/2010/main" val="497945111"/>
       </p:ext>
     </p:extLst>
   </p:cSld>
@@ -13329,59 +12980,95 @@
         <p:spPr/>
         <p:txBody>
           <a:bodyPr>
-            <a:normAutofit fontScale="90000"/>
-          </a:bodyPr>
-          <a:lstStyle/>
-          <a:p>
-            <a:r>
-              <a:rPr lang="en-US" dirty="0"/>
-              <a:t>Deploy the application to Kubernetes cluster - Demo</a:t>
-            </a:r>
-          </a:p>
-        </p:txBody>
-      </p:sp>
-      <p:sp>
-        <p:nvSpPr>
-          <p:cNvPr id="3" name="Content Placeholder 2"/>
-          <p:cNvSpPr>
-            <a:spLocks noGrp="1"/>
-          </p:cNvSpPr>
-          <p:nvPr>
-            <p:ph idx="1"/>
-          </p:nvPr>
-        </p:nvSpPr>
-        <p:spPr/>
-        <p:txBody>
-          <a:bodyPr>
             <a:normAutofit/>
           </a:bodyPr>
           <a:lstStyle/>
           <a:p>
             <a:r>
               <a:rPr lang="en-US" dirty="0"/>
-              <a:t>Deploy the Application</a:t>
-            </a:r>
-          </a:p>
-          <a:p>
+              <a:t>Deploy the application to Kubernetes cluster</a:t>
+            </a:r>
+          </a:p>
+        </p:txBody>
+      </p:sp>
+      <p:sp>
+        <p:nvSpPr>
+          <p:cNvPr id="3" name="Content Placeholder 2"/>
+          <p:cNvSpPr>
+            <a:spLocks noGrp="1"/>
+          </p:cNvSpPr>
+          <p:nvPr>
+            <p:ph idx="1"/>
+          </p:nvPr>
+        </p:nvSpPr>
+        <p:spPr/>
+        <p:txBody>
+          <a:bodyPr/>
+          <a:lstStyle/>
+          <a:p>
+            <a:r>
+              <a:rPr lang="en-US" dirty="0"/>
+              <a:t>Exposing Our Application </a:t>
+            </a:r>
+          </a:p>
+          <a:p>
+            <a:r>
+              <a:rPr lang="en-US" dirty="0"/>
+              <a:t>Use a Kubernetes Resource called a Service </a:t>
+            </a:r>
+          </a:p>
+          <a:p>
+            <a:r>
+              <a:rPr lang="en-US" dirty="0"/>
+              <a:t>Stable reference point within the cluster network</a:t>
+            </a:r>
+          </a:p>
+          <a:p>
+            <a:pPr lvl="1"/>
+            <a:r>
+              <a:rPr lang="en-US" dirty="0"/>
+              <a:t>Unchanging IP with </a:t>
+            </a:r>
+            <a:r>
+              <a:rPr lang="en-US" dirty="0" err="1"/>
+              <a:t>Type:ClusterIP</a:t>
+            </a:r>
             <a:endParaRPr lang="en-US" dirty="0"/>
           </a:p>
           <a:p>
-            <a:r>
-              <a:rPr lang="en-US" dirty="0"/>
-              <a:t>Run the Application</a:t>
-            </a:r>
-          </a:p>
-          <a:p>
+            <a:pPr lvl="1"/>
+            <a:r>
+              <a:rPr lang="en-US" dirty="0"/>
+              <a:t>DNS Entry for lookups by name </a:t>
+            </a:r>
+          </a:p>
+          <a:p>
+            <a:r>
+              <a:rPr lang="en-US" dirty="0"/>
+              <a:t>Also can allow access from outside the cluster </a:t>
+            </a:r>
+          </a:p>
+          <a:p>
+            <a:pPr lvl="1"/>
+            <a:r>
+              <a:rPr lang="en-US" dirty="0" err="1"/>
+              <a:t>Type:NodePort</a:t>
+            </a:r>
             <a:endParaRPr lang="en-US" dirty="0"/>
           </a:p>
           <a:p>
-            <a:r>
-              <a:rPr lang="en-US" dirty="0"/>
-              <a:t>Check if application is running </a:t>
-            </a:r>
-          </a:p>
-          <a:p>
-            <a:endParaRPr lang="en-US" dirty="0"/>
+            <a:pPr lvl="1"/>
+            <a:r>
+              <a:rPr lang="en-US" dirty="0" err="1"/>
+              <a:t>Type:LoadBalancer</a:t>
+            </a:r>
+            <a:r>
+              <a:rPr lang="en-US" dirty="0"/>
+              <a:t> </a:t>
+            </a:r>
+            <a:endParaRPr lang="en-US" dirty="0">
+              <a:effectLst/>
+            </a:endParaRPr>
           </a:p>
         </p:txBody>
       </p:sp>
@@ -13411,7 +13098,7 @@
     </p:spTree>
     <p:extLst>
       <p:ext uri="{BB962C8B-B14F-4D97-AF65-F5344CB8AC3E}">
-        <p14:creationId xmlns:p14="http://schemas.microsoft.com/office/powerpoint/2010/main" val="497945111"/>
+        <p14:creationId xmlns:p14="http://schemas.microsoft.com/office/powerpoint/2010/main" val="467648702"/>
       </p:ext>
     </p:extLst>
   </p:cSld>
@@ -13474,72 +13161,60 @@
         </p:nvSpPr>
         <p:spPr/>
         <p:txBody>
-          <a:bodyPr/>
-          <a:lstStyle/>
-          <a:p>
-            <a:r>
-              <a:rPr lang="en-US" dirty="0"/>
-              <a:t>Exposing Our Application </a:t>
-            </a:r>
-          </a:p>
-          <a:p>
-            <a:r>
-              <a:rPr lang="en-US" dirty="0"/>
-              <a:t>Use a Kubernetes Resource called a Service </a:t>
-            </a:r>
-          </a:p>
-          <a:p>
-            <a:r>
-              <a:rPr lang="en-US" dirty="0"/>
-              <a:t>Stable reference point within the cluster network</a:t>
-            </a:r>
-          </a:p>
-          <a:p>
-            <a:pPr lvl="1"/>
-            <a:r>
-              <a:rPr lang="en-US" dirty="0"/>
-              <a:t>Unchanging IP with </a:t>
+          <a:bodyPr>
+            <a:normAutofit/>
+          </a:bodyPr>
+          <a:lstStyle/>
+          <a:p>
+            <a:r>
+              <a:rPr lang="en-US" dirty="0"/>
+              <a:t>Expose the application through </a:t>
             </a:r>
             <a:r>
               <a:rPr lang="en-US" dirty="0" err="1"/>
-              <a:t>Type:ClusterIP</a:t>
+              <a:t>NodePort</a:t>
             </a:r>
             <a:endParaRPr lang="en-US" dirty="0"/>
           </a:p>
           <a:p>
-            <a:pPr lvl="1"/>
-            <a:r>
-              <a:rPr lang="en-US" dirty="0"/>
-              <a:t>DNS Entry for lookups by name </a:t>
-            </a:r>
-          </a:p>
-          <a:p>
-            <a:r>
-              <a:rPr lang="en-US" dirty="0"/>
-              <a:t>Also can allow access from outside the cluster </a:t>
-            </a:r>
-          </a:p>
-          <a:p>
-            <a:pPr lvl="1"/>
+            <a:endParaRPr lang="en-US" dirty="0"/>
+          </a:p>
+          <a:p>
+            <a:r>
+              <a:rPr lang="en-US" dirty="0"/>
+              <a:t>Find the Port that 8080 is mapped to</a:t>
+            </a:r>
+          </a:p>
+          <a:p>
             <a:r>
               <a:rPr lang="en-US" dirty="0" err="1"/>
-              <a:t>Type:NodePort</a:t>
-            </a:r>
+              <a:t>kubectl</a:t>
+            </a:r>
+            <a:r>
+              <a:rPr lang="en-US" dirty="0"/>
+              <a:t> describe service &lt;name-of-deployment&gt;</a:t>
+            </a:r>
+          </a:p>
+          <a:p>
             <a:endParaRPr lang="en-US" dirty="0"/>
           </a:p>
           <a:p>
-            <a:pPr lvl="1"/>
-            <a:r>
-              <a:rPr lang="en-US" dirty="0" err="1"/>
-              <a:t>Type:LoadBalancer</a:t>
-            </a:r>
-            <a:r>
-              <a:rPr lang="en-US" dirty="0"/>
-              <a:t> </a:t>
-            </a:r>
-            <a:endParaRPr lang="en-US" dirty="0">
-              <a:effectLst/>
-            </a:endParaRPr>
+            <a:r>
+              <a:rPr lang="en-US" dirty="0"/>
+              <a:t>Find the IP of the Kubernetes cluster</a:t>
+            </a:r>
+          </a:p>
+          <a:p>
+            <a:endParaRPr lang="en-US" dirty="0"/>
+          </a:p>
+          <a:p>
+            <a:r>
+              <a:rPr lang="en-US" dirty="0"/>
+              <a:t>Test the application</a:t>
+            </a:r>
+          </a:p>
+          <a:p>
+            <a:endParaRPr lang="en-US" b="0" dirty="0"/>
           </a:p>
         </p:txBody>
       </p:sp>
@@ -13569,7 +13244,7 @@
     </p:spTree>
     <p:extLst>
       <p:ext uri="{BB962C8B-B14F-4D97-AF65-F5344CB8AC3E}">
-        <p14:creationId xmlns:p14="http://schemas.microsoft.com/office/powerpoint/2010/main" val="467648702"/>
+        <p14:creationId xmlns:p14="http://schemas.microsoft.com/office/powerpoint/2010/main" val="3117337657"/>
       </p:ext>
     </p:extLst>
   </p:cSld>
@@ -13608,9 +13283,7 @@
         </p:nvSpPr>
         <p:spPr/>
         <p:txBody>
-          <a:bodyPr>
-            <a:normAutofit/>
-          </a:bodyPr>
+          <a:bodyPr/>
           <a:lstStyle/>
           <a:p>
             <a:r>
@@ -13632,60 +13305,60 @@
         </p:nvSpPr>
         <p:spPr/>
         <p:txBody>
-          <a:bodyPr>
-            <a:normAutofit/>
-          </a:bodyPr>
-          <a:lstStyle/>
-          <a:p>
-            <a:r>
-              <a:rPr lang="en-US" dirty="0"/>
-              <a:t>Expose the application through </a:t>
-            </a:r>
-            <a:r>
-              <a:rPr lang="en-US" dirty="0" err="1"/>
-              <a:t>NodePort</a:t>
+          <a:bodyPr/>
+          <a:lstStyle/>
+          <a:p>
+            <a:r>
+              <a:rPr lang="en-US" dirty="0"/>
+              <a:t>Test the application</a:t>
+            </a:r>
+          </a:p>
+          <a:p>
+            <a:r>
+              <a:rPr lang="en-US" b="0" dirty="0"/>
+              <a:t>curl &lt;public-IP&gt;:&lt;</a:t>
+            </a:r>
+            <a:r>
+              <a:rPr lang="en-US" b="0" dirty="0" err="1"/>
+              <a:t>nodeport</a:t>
+            </a:r>
+            <a:r>
+              <a:rPr lang="en-US" b="0" dirty="0"/>
+              <a:t>&gt;</a:t>
+            </a:r>
+          </a:p>
+          <a:p>
+            <a:endParaRPr lang="en-US" b="0" dirty="0"/>
+          </a:p>
+          <a:p>
+            <a:r>
+              <a:rPr lang="en-US" dirty="0"/>
+              <a:t>Cleanup</a:t>
+            </a:r>
+          </a:p>
+          <a:p>
+            <a:r>
+              <a:rPr lang="en-US" b="0" dirty="0" err="1"/>
+              <a:t>kubectl</a:t>
+            </a:r>
+            <a:r>
+              <a:rPr lang="en-US" b="0" dirty="0"/>
+              <a:t> delete deployment hello-world</a:t>
+            </a:r>
+          </a:p>
+          <a:p>
+            <a:r>
+              <a:rPr lang="en-US" b="0" dirty="0" err="1"/>
+              <a:t>kubectl</a:t>
+            </a:r>
+            <a:r>
+              <a:rPr lang="en-US" b="0" dirty="0"/>
+              <a:t> delete service hello-world</a:t>
             </a:r>
             <a:endParaRPr lang="en-US" dirty="0"/>
           </a:p>
           <a:p>
             <a:endParaRPr lang="en-US" dirty="0"/>
-          </a:p>
-          <a:p>
-            <a:r>
-              <a:rPr lang="en-US" dirty="0"/>
-              <a:t>Find the Port that 8080 is mapped to</a:t>
-            </a:r>
-          </a:p>
-          <a:p>
-            <a:r>
-              <a:rPr lang="en-US" dirty="0" err="1"/>
-              <a:t>kubectl</a:t>
-            </a:r>
-            <a:r>
-              <a:rPr lang="en-US" dirty="0"/>
-              <a:t> describe service &lt;name-of-deployment&gt;</a:t>
-            </a:r>
-          </a:p>
-          <a:p>
-            <a:endParaRPr lang="en-US" dirty="0"/>
-          </a:p>
-          <a:p>
-            <a:r>
-              <a:rPr lang="en-US" dirty="0"/>
-              <a:t>Find the IP of the Kubernetes cluster</a:t>
-            </a:r>
-          </a:p>
-          <a:p>
-            <a:endParaRPr lang="en-US" dirty="0"/>
-          </a:p>
-          <a:p>
-            <a:r>
-              <a:rPr lang="en-US" dirty="0"/>
-              <a:t>Test the application</a:t>
-            </a:r>
-          </a:p>
-          <a:p>
-            <a:endParaRPr lang="en-US" b="0" dirty="0"/>
           </a:p>
         </p:txBody>
       </p:sp>
@@ -13715,7 +13388,7 @@
     </p:spTree>
     <p:extLst>
       <p:ext uri="{BB962C8B-B14F-4D97-AF65-F5344CB8AC3E}">
-        <p14:creationId xmlns:p14="http://schemas.microsoft.com/office/powerpoint/2010/main" val="3117337657"/>
+        <p14:creationId xmlns:p14="http://schemas.microsoft.com/office/powerpoint/2010/main" val="1175790333"/>
       </p:ext>
     </p:extLst>
   </p:cSld>
@@ -13744,7 +13417,32 @@
       </p:grpSpPr>
       <p:sp>
         <p:nvSpPr>
-          <p:cNvPr id="2" name="Title 1"/>
+          <p:cNvPr id="2" name="Text Placeholder 1"/>
+          <p:cNvSpPr>
+            <a:spLocks noGrp="1"/>
+          </p:cNvSpPr>
+          <p:nvPr>
+            <p:ph type="body" sz="quarter" idx="10"/>
+          </p:nvPr>
+        </p:nvSpPr>
+        <p:spPr/>
+        <p:txBody>
+          <a:bodyPr/>
+          <a:lstStyle/>
+          <a:p>
+            <a:endParaRPr lang="en-US" dirty="0"/>
+          </a:p>
+          <a:p>
+            <a:r>
+              <a:rPr lang="en-US" dirty="0"/>
+              <a:t>Feb 5 2018</a:t>
+            </a:r>
+          </a:p>
+        </p:txBody>
+      </p:sp>
+      <p:sp>
+        <p:nvSpPr>
+          <p:cNvPr id="3" name="Title 2"/>
           <p:cNvSpPr>
             <a:spLocks noGrp="1"/>
           </p:cNvSpPr>
@@ -13754,112 +13452,34 @@
         </p:nvSpPr>
         <p:spPr/>
         <p:txBody>
-          <a:bodyPr/>
-          <a:lstStyle/>
-          <a:p>
-            <a:r>
-              <a:rPr lang="en-US" dirty="0"/>
-              <a:t>Deploy the application to Kubernetes cluster</a:t>
-            </a:r>
-          </a:p>
-        </p:txBody>
-      </p:sp>
-      <p:sp>
-        <p:nvSpPr>
-          <p:cNvPr id="3" name="Content Placeholder 2"/>
-          <p:cNvSpPr>
-            <a:spLocks noGrp="1"/>
-          </p:cNvSpPr>
-          <p:nvPr>
-            <p:ph idx="1"/>
-          </p:nvPr>
-        </p:nvSpPr>
-        <p:spPr/>
-        <p:txBody>
-          <a:bodyPr/>
-          <a:lstStyle/>
-          <a:p>
-            <a:r>
-              <a:rPr lang="en-US" dirty="0"/>
-              <a:t>Test the application</a:t>
-            </a:r>
-          </a:p>
-          <a:p>
-            <a:r>
-              <a:rPr lang="en-US" b="0" dirty="0"/>
-              <a:t>curl &lt;public-IP&gt;:&lt;</a:t>
-            </a:r>
-            <a:r>
-              <a:rPr lang="en-US" b="0" dirty="0" err="1"/>
-              <a:t>nodeport</a:t>
-            </a:r>
-            <a:r>
-              <a:rPr lang="en-US" b="0" dirty="0"/>
-              <a:t>&gt;</a:t>
-            </a:r>
-          </a:p>
-          <a:p>
-            <a:endParaRPr lang="en-US" b="0" dirty="0"/>
-          </a:p>
-          <a:p>
-            <a:r>
-              <a:rPr lang="en-US" dirty="0"/>
-              <a:t>Cleanup</a:t>
-            </a:r>
-          </a:p>
-          <a:p>
-            <a:r>
-              <a:rPr lang="en-US" b="0" dirty="0" err="1"/>
-              <a:t>kubectl</a:t>
-            </a:r>
-            <a:r>
-              <a:rPr lang="en-US" b="0" dirty="0"/>
-              <a:t> delete deployment hello-world</a:t>
-            </a:r>
-          </a:p>
-          <a:p>
-            <a:r>
-              <a:rPr lang="en-US" b="0" dirty="0" err="1"/>
-              <a:t>kubectl</a:t>
-            </a:r>
-            <a:r>
-              <a:rPr lang="en-US" b="0" dirty="0"/>
-              <a:t> delete service hello-world</a:t>
+          <a:bodyPr>
+            <a:normAutofit fontScale="90000"/>
+          </a:bodyPr>
+          <a:lstStyle/>
+          <a:p>
+            <a:r>
+              <a:rPr lang="en-US" dirty="0"/>
+              <a:t>Developer Advocacy </a:t>
+            </a:r>
+            <a:br>
+              <a:rPr lang="en-US" dirty="0"/>
+            </a:br>
+            <a:r>
+              <a:rPr lang="en-US" dirty="0" err="1"/>
+              <a:t>Kube</a:t>
+            </a:r>
+            <a:r>
+              <a:rPr lang="en-US"/>
+              <a:t> 101 - Lab 2</a:t>
             </a:r>
             <a:endParaRPr lang="en-US" dirty="0"/>
-          </a:p>
-          <a:p>
-            <a:endParaRPr lang="en-US" dirty="0"/>
-          </a:p>
-        </p:txBody>
-      </p:sp>
-      <p:sp>
-        <p:nvSpPr>
-          <p:cNvPr id="4" name="Slide Number Placeholder 3"/>
-          <p:cNvSpPr>
-            <a:spLocks noGrp="1"/>
-          </p:cNvSpPr>
-          <p:nvPr>
-            <p:ph type="sldNum" sz="quarter" idx="12"/>
-          </p:nvPr>
-        </p:nvSpPr>
-        <p:spPr/>
-        <p:txBody>
-          <a:bodyPr/>
-          <a:lstStyle/>
-          <a:p>
-            <a:fld id="{D924A81F-5E2C-2E4D-A217-11B91391D3AF}" type="slidenum">
-              <a:rPr lang="en-US" smtClean="0"/>
-              <a:t>23</a:t>
-            </a:fld>
-            <a:endParaRPr lang="en-US"/>
           </a:p>
         </p:txBody>
       </p:sp>
     </p:spTree>
     <p:extLst>
       <p:ext uri="{BB962C8B-B14F-4D97-AF65-F5344CB8AC3E}">
-        <p14:creationId xmlns:p14="http://schemas.microsoft.com/office/powerpoint/2010/main" val="1175790333"/>
+        <p14:creationId xmlns:p14="http://schemas.microsoft.com/office/powerpoint/2010/main" val="718799704"/>
       </p:ext>
     </p:extLst>
   </p:cSld>
@@ -13888,12 +13508,18 @@
       </p:grpSpPr>
       <p:sp>
         <p:nvSpPr>
-          <p:cNvPr id="2" name="Text Placeholder 1"/>
-          <p:cNvSpPr>
-            <a:spLocks noGrp="1"/>
-          </p:cNvSpPr>
-          <p:nvPr>
-            <p:ph type="body" sz="quarter" idx="10"/>
+          <p:cNvPr id="2" name="Title 1">
+            <a:extLst>
+              <a:ext uri="{FF2B5EF4-FFF2-40B4-BE49-F238E27FC236}">
+                <a16:creationId xmlns:a16="http://schemas.microsoft.com/office/drawing/2014/main" id="{C1B50A14-B970-4346-96B8-4E8B6A7CDBE9}"/>
+              </a:ext>
+            </a:extLst>
+          </p:cNvPr>
+          <p:cNvSpPr>
+            <a:spLocks noGrp="1"/>
+          </p:cNvSpPr>
+          <p:nvPr>
+            <p:ph type="title"/>
           </p:nvPr>
         </p:nvSpPr>
         <p:spPr/>
@@ -13901,56 +13527,92 @@
           <a:bodyPr/>
           <a:lstStyle/>
           <a:p>
-            <a:endParaRPr lang="en-US" dirty="0"/>
-          </a:p>
-          <a:p>
-            <a:r>
-              <a:rPr lang="en-US" dirty="0"/>
-              <a:t>Feb 5 2018</a:t>
-            </a:r>
-          </a:p>
-        </p:txBody>
-      </p:sp>
-      <p:sp>
-        <p:nvSpPr>
-          <p:cNvPr id="3" name="Title 2"/>
-          <p:cNvSpPr>
-            <a:spLocks noGrp="1"/>
-          </p:cNvSpPr>
-          <p:nvPr>
-            <p:ph type="title"/>
+            <a:r>
+              <a:rPr lang="en-US" dirty="0"/>
+              <a:t>Commentary about distributed apps</a:t>
+            </a:r>
+          </a:p>
+        </p:txBody>
+      </p:sp>
+      <p:sp>
+        <p:nvSpPr>
+          <p:cNvPr id="3" name="Content Placeholder 2">
+            <a:extLst>
+              <a:ext uri="{FF2B5EF4-FFF2-40B4-BE49-F238E27FC236}">
+                <a16:creationId xmlns:a16="http://schemas.microsoft.com/office/drawing/2014/main" id="{81C33474-31DB-DA40-A3E0-21E77715C812}"/>
+              </a:ext>
+            </a:extLst>
+          </p:cNvPr>
+          <p:cNvSpPr>
+            <a:spLocks noGrp="1"/>
+          </p:cNvSpPr>
+          <p:nvPr>
+            <p:ph idx="1"/>
           </p:nvPr>
         </p:nvSpPr>
         <p:spPr/>
         <p:txBody>
-          <a:bodyPr>
-            <a:normAutofit fontScale="90000"/>
-          </a:bodyPr>
-          <a:lstStyle/>
-          <a:p>
-            <a:r>
-              <a:rPr lang="en-US" dirty="0"/>
-              <a:t>Developer Advocacy </a:t>
-            </a:r>
-            <a:br>
-              <a:rPr lang="en-US" dirty="0"/>
-            </a:br>
-            <a:r>
-              <a:rPr lang="en-US" dirty="0" err="1"/>
-              <a:t>Kube</a:t>
-            </a:r>
-            <a:r>
-              <a:rPr lang="en-US"/>
-              <a:t> 101 - Lab 2</a:t>
-            </a:r>
-            <a:endParaRPr lang="en-US" dirty="0"/>
+          <a:bodyPr/>
+          <a:lstStyle/>
+          <a:p>
+            <a:r>
+              <a:rPr lang="en-US" dirty="0"/>
+              <a:t>One single instance, what it is it good for, absolutely nothing</a:t>
+            </a:r>
+          </a:p>
+          <a:p>
+            <a:r>
+              <a:rPr lang="en-US" dirty="0"/>
+              <a:t>Especially if it goes down.</a:t>
+            </a:r>
+          </a:p>
+          <a:p>
+            <a:r>
+              <a:rPr lang="en-US" dirty="0"/>
+              <a:t>Let’s replicate</a:t>
+            </a:r>
+          </a:p>
+          <a:p>
+            <a:r>
+              <a:rPr lang="en-US" dirty="0"/>
+              <a:t>Recap: Kubernetes is an orchestrator, good for not only running, but also lifecycle</a:t>
+            </a:r>
+          </a:p>
+        </p:txBody>
+      </p:sp>
+      <p:sp>
+        <p:nvSpPr>
+          <p:cNvPr id="4" name="Slide Number Placeholder 3">
+            <a:extLst>
+              <a:ext uri="{FF2B5EF4-FFF2-40B4-BE49-F238E27FC236}">
+                <a16:creationId xmlns:a16="http://schemas.microsoft.com/office/drawing/2014/main" id="{FB8FD7EF-E245-8742-9D94-D576ADFD2553}"/>
+              </a:ext>
+            </a:extLst>
+          </p:cNvPr>
+          <p:cNvSpPr>
+            <a:spLocks noGrp="1"/>
+          </p:cNvSpPr>
+          <p:nvPr>
+            <p:ph type="sldNum" sz="quarter" idx="12"/>
+          </p:nvPr>
+        </p:nvSpPr>
+        <p:spPr/>
+        <p:txBody>
+          <a:bodyPr/>
+          <a:lstStyle/>
+          <a:p>
+            <a:fld id="{D924A81F-5E2C-2E4D-A217-11B91391D3AF}" type="slidenum">
+              <a:rPr lang="en-US" smtClean="0"/>
+              <a:t>24</a:t>
+            </a:fld>
+            <a:endParaRPr lang="en-US"/>
           </a:p>
         </p:txBody>
       </p:sp>
     </p:spTree>
     <p:extLst>
       <p:ext uri="{BB962C8B-B14F-4D97-AF65-F5344CB8AC3E}">
-        <p14:creationId xmlns:p14="http://schemas.microsoft.com/office/powerpoint/2010/main" val="718799704"/>
+        <p14:creationId xmlns:p14="http://schemas.microsoft.com/office/powerpoint/2010/main" val="2040332951"/>
       </p:ext>
     </p:extLst>
   </p:cSld>
@@ -13979,13 +13641,7 @@
       </p:grpSpPr>
       <p:sp>
         <p:nvSpPr>
-          <p:cNvPr id="2" name="Title 1">
-            <a:extLst>
-              <a:ext uri="{FF2B5EF4-FFF2-40B4-BE49-F238E27FC236}">
-                <a16:creationId xmlns="" xmlns:a16="http://schemas.microsoft.com/office/drawing/2014/main" id="{C1B50A14-B970-4346-96B8-4E8B6A7CDBE9}"/>
-              </a:ext>
-            </a:extLst>
-          </p:cNvPr>
+          <p:cNvPr id="2" name="Title 1"/>
           <p:cNvSpPr>
             <a:spLocks noGrp="1"/>
           </p:cNvSpPr>
@@ -14000,20 +13656,14 @@
           <a:p>
             <a:r>
               <a:rPr lang="en-US" dirty="0"/>
-              <a:t>Commentary about distributed apps</a:t>
-            </a:r>
-          </a:p>
-        </p:txBody>
-      </p:sp>
-      <p:sp>
-        <p:nvSpPr>
-          <p:cNvPr id="3" name="Content Placeholder 2">
-            <a:extLst>
-              <a:ext uri="{FF2B5EF4-FFF2-40B4-BE49-F238E27FC236}">
-                <a16:creationId xmlns="" xmlns:a16="http://schemas.microsoft.com/office/drawing/2014/main" id="{81C33474-31DB-DA40-A3E0-21E77715C812}"/>
-              </a:ext>
-            </a:extLst>
-          </p:cNvPr>
+              <a:t>Demo 1 - Scale</a:t>
+            </a:r>
+          </a:p>
+        </p:txBody>
+      </p:sp>
+      <p:sp>
+        <p:nvSpPr>
+          <p:cNvPr id="3" name="Content Placeholder 2"/>
           <p:cNvSpPr>
             <a:spLocks noGrp="1"/>
           </p:cNvSpPr>
@@ -14026,40 +13676,59 @@
           <a:bodyPr/>
           <a:lstStyle/>
           <a:p>
-            <a:r>
-              <a:rPr lang="en-US" dirty="0"/>
-              <a:t>One single instance, what it is it good for, absolutely nothing</a:t>
-            </a:r>
-          </a:p>
-          <a:p>
-            <a:r>
-              <a:rPr lang="en-US" dirty="0"/>
-              <a:t>Especially if it goes down.</a:t>
-            </a:r>
-          </a:p>
-          <a:p>
-            <a:r>
-              <a:rPr lang="en-US" dirty="0"/>
-              <a:t>Let’s replicate</a:t>
-            </a:r>
-          </a:p>
-          <a:p>
-            <a:r>
-              <a:rPr lang="en-US" dirty="0"/>
-              <a:t>Recap: Kubernetes is an orchestrator, good for not only running, but also lifecycle</a:t>
-            </a:r>
-          </a:p>
-        </p:txBody>
-      </p:sp>
-      <p:sp>
-        <p:nvSpPr>
-          <p:cNvPr id="4" name="Slide Number Placeholder 3">
-            <a:extLst>
-              <a:ext uri="{FF2B5EF4-FFF2-40B4-BE49-F238E27FC236}">
-                <a16:creationId xmlns="" xmlns:a16="http://schemas.microsoft.com/office/drawing/2014/main" id="{FB8FD7EF-E245-8742-9D94-D576ADFD2553}"/>
-              </a:ext>
-            </a:extLst>
-          </p:cNvPr>
+            <a:pPr>
+              <a:buClrTx/>
+            </a:pPr>
+            <a:r>
+              <a:rPr lang="en-US" dirty="0"/>
+              <a:t>Using the existing hello-world deployment</a:t>
+            </a:r>
+          </a:p>
+          <a:p>
+            <a:pPr lvl="1"/>
+            <a:r>
+              <a:rPr lang="en-US" dirty="0"/>
+              <a:t>Start the watch command doing curl in the background</a:t>
+            </a:r>
+          </a:p>
+          <a:p>
+            <a:pPr>
+              <a:buClrTx/>
+            </a:pPr>
+            <a:r>
+              <a:rPr lang="en-US" dirty="0"/>
+              <a:t>Change the number of replicas</a:t>
+            </a:r>
+          </a:p>
+          <a:p>
+            <a:pPr>
+              <a:buClrTx/>
+            </a:pPr>
+            <a:r>
+              <a:rPr lang="en-US" dirty="0"/>
+              <a:t>Observe the change</a:t>
+            </a:r>
+          </a:p>
+          <a:p>
+            <a:pPr lvl="1"/>
+            <a:r>
+              <a:rPr lang="en-US" dirty="0" err="1"/>
+              <a:t>Replicasets</a:t>
+            </a:r>
+            <a:endParaRPr lang="en-US" dirty="0"/>
+          </a:p>
+          <a:p>
+            <a:pPr lvl="1"/>
+            <a:r>
+              <a:rPr lang="en-US" dirty="0"/>
+              <a:t>Rollout</a:t>
+            </a:r>
+          </a:p>
+        </p:txBody>
+      </p:sp>
+      <p:sp>
+        <p:nvSpPr>
+          <p:cNvPr id="4" name="Slide Number Placeholder 3"/>
           <p:cNvSpPr>
             <a:spLocks noGrp="1"/>
           </p:cNvSpPr>
@@ -14083,7 +13752,7 @@
     </p:spTree>
     <p:extLst>
       <p:ext uri="{BB962C8B-B14F-4D97-AF65-F5344CB8AC3E}">
-        <p14:creationId xmlns:p14="http://schemas.microsoft.com/office/powerpoint/2010/main" val="2040332951"/>
+        <p14:creationId xmlns:p14="http://schemas.microsoft.com/office/powerpoint/2010/main" val="1299145536"/>
       </p:ext>
     </p:extLst>
   </p:cSld>
@@ -14112,7 +13781,13 @@
       </p:grpSpPr>
       <p:sp>
         <p:nvSpPr>
-          <p:cNvPr id="2" name="Title 1"/>
+          <p:cNvPr id="2" name="Title 1">
+            <a:extLst>
+              <a:ext uri="{FF2B5EF4-FFF2-40B4-BE49-F238E27FC236}">
+                <a16:creationId xmlns:a16="http://schemas.microsoft.com/office/drawing/2014/main" id="{8B9F17B3-A29A-B742-ACFC-B3DD35B6B31A}"/>
+              </a:ext>
+            </a:extLst>
+          </p:cNvPr>
           <p:cNvSpPr>
             <a:spLocks noGrp="1"/>
           </p:cNvSpPr>
@@ -14127,14 +13802,20 @@
           <a:p>
             <a:r>
               <a:rPr lang="en-US" dirty="0"/>
-              <a:t>Demo 1 - Scale</a:t>
-            </a:r>
-          </a:p>
-        </p:txBody>
-      </p:sp>
-      <p:sp>
-        <p:nvSpPr>
-          <p:cNvPr id="3" name="Content Placeholder 2"/>
+              <a:t>Demo 2 - Rollout New Version</a:t>
+            </a:r>
+          </a:p>
+        </p:txBody>
+      </p:sp>
+      <p:sp>
+        <p:nvSpPr>
+          <p:cNvPr id="3" name="Content Placeholder 2">
+            <a:extLst>
+              <a:ext uri="{FF2B5EF4-FFF2-40B4-BE49-F238E27FC236}">
+                <a16:creationId xmlns:a16="http://schemas.microsoft.com/office/drawing/2014/main" id="{063037B7-2112-2D43-AD2C-8962E1C07583}"/>
+              </a:ext>
+            </a:extLst>
+          </p:cNvPr>
           <p:cNvSpPr>
             <a:spLocks noGrp="1"/>
           </p:cNvSpPr>
@@ -14152,14 +13833,7 @@
             </a:pPr>
             <a:r>
               <a:rPr lang="en-US" dirty="0"/>
-              <a:t>Using the existing hello-world deployment</a:t>
-            </a:r>
-          </a:p>
-          <a:p>
-            <a:pPr lvl="1"/>
-            <a:r>
-              <a:rPr lang="en-US" dirty="0"/>
-              <a:t>Start the watch command doing curl in the background</a:t>
+              <a:t>Build a new version of the app</a:t>
             </a:r>
           </a:p>
           <a:p>
@@ -14168,7 +13842,7 @@
             </a:pPr>
             <a:r>
               <a:rPr lang="en-US" dirty="0"/>
-              <a:t>Change the number of replicas</a:t>
+              <a:t>Set the image</a:t>
             </a:r>
           </a:p>
           <a:p>
@@ -14177,29 +13851,39 @@
             </a:pPr>
             <a:r>
               <a:rPr lang="en-US" dirty="0"/>
-              <a:t>Observe the change</a:t>
+              <a:t>Watch the new instance it rollout</a:t>
             </a:r>
           </a:p>
           <a:p>
             <a:pPr lvl="1"/>
             <a:r>
-              <a:rPr lang="en-US" dirty="0" err="1"/>
-              <a:t>Replicasets</a:t>
-            </a:r>
+              <a:rPr lang="en-US" dirty="0"/>
+              <a:t>see the values returned change</a:t>
+            </a:r>
+          </a:p>
+          <a:p>
+            <a:pPr>
+              <a:buClrTx/>
+            </a:pPr>
             <a:endParaRPr lang="en-US" dirty="0"/>
           </a:p>
           <a:p>
-            <a:pPr lvl="1"/>
-            <a:r>
-              <a:rPr lang="en-US" dirty="0"/>
-              <a:t>Rollout</a:t>
-            </a:r>
-          </a:p>
-        </p:txBody>
-      </p:sp>
-      <p:sp>
-        <p:nvSpPr>
-          <p:cNvPr id="4" name="Slide Number Placeholder 3"/>
+            <a:pPr>
+              <a:buClrTx/>
+            </a:pPr>
+            <a:endParaRPr lang="en-US" dirty="0"/>
+          </a:p>
+        </p:txBody>
+      </p:sp>
+      <p:sp>
+        <p:nvSpPr>
+          <p:cNvPr id="4" name="Slide Number Placeholder 3">
+            <a:extLst>
+              <a:ext uri="{FF2B5EF4-FFF2-40B4-BE49-F238E27FC236}">
+                <a16:creationId xmlns:a16="http://schemas.microsoft.com/office/drawing/2014/main" id="{4F225741-B372-2F47-8851-DB884C2FC55E}"/>
+              </a:ext>
+            </a:extLst>
+          </p:cNvPr>
           <p:cNvSpPr>
             <a:spLocks noGrp="1"/>
           </p:cNvSpPr>
@@ -14223,7 +13907,7 @@
     </p:spTree>
     <p:extLst>
       <p:ext uri="{BB962C8B-B14F-4D97-AF65-F5344CB8AC3E}">
-        <p14:creationId xmlns:p14="http://schemas.microsoft.com/office/powerpoint/2010/main" val="1299145536"/>
+        <p14:creationId xmlns:p14="http://schemas.microsoft.com/office/powerpoint/2010/main" val="1843249446"/>
       </p:ext>
     </p:extLst>
   </p:cSld>
@@ -14252,13 +13936,35 @@
       </p:grpSpPr>
       <p:sp>
         <p:nvSpPr>
-          <p:cNvPr id="2" name="Title 1">
-            <a:extLst>
-              <a:ext uri="{FF2B5EF4-FFF2-40B4-BE49-F238E27FC236}">
-                <a16:creationId xmlns="" xmlns:a16="http://schemas.microsoft.com/office/drawing/2014/main" id="{8B9F17B3-A29A-B742-ACFC-B3DD35B6B31A}"/>
-              </a:ext>
-            </a:extLst>
-          </p:cNvPr>
+          <p:cNvPr id="2" name="Text Placeholder 1"/>
+          <p:cNvSpPr>
+            <a:spLocks noGrp="1"/>
+          </p:cNvSpPr>
+          <p:nvPr>
+            <p:ph type="body" sz="quarter" idx="10"/>
+          </p:nvPr>
+        </p:nvSpPr>
+        <p:spPr/>
+        <p:txBody>
+          <a:bodyPr/>
+          <a:lstStyle/>
+          <a:p>
+            <a:endParaRPr lang="en-US"/>
+          </a:p>
+          <a:p>
+            <a:endParaRPr lang="en-US" dirty="0"/>
+          </a:p>
+          <a:p>
+            <a:r>
+              <a:rPr lang="en-US" dirty="0"/>
+              <a:t>Feb 5 2018</a:t>
+            </a:r>
+          </a:p>
+        </p:txBody>
+      </p:sp>
+      <p:sp>
+        <p:nvSpPr>
+          <p:cNvPr id="3" name="Title 2"/>
           <p:cNvSpPr>
             <a:spLocks noGrp="1"/>
           </p:cNvSpPr>
@@ -14268,125 +13974,33 @@
         </p:nvSpPr>
         <p:spPr/>
         <p:txBody>
-          <a:bodyPr/>
-          <a:lstStyle/>
-          <a:p>
-            <a:r>
-              <a:rPr lang="en-US" dirty="0"/>
-              <a:t>Demo 2 - Rollout New Version</a:t>
-            </a:r>
-          </a:p>
-        </p:txBody>
-      </p:sp>
-      <p:sp>
-        <p:nvSpPr>
-          <p:cNvPr id="3" name="Content Placeholder 2">
-            <a:extLst>
-              <a:ext uri="{FF2B5EF4-FFF2-40B4-BE49-F238E27FC236}">
-                <a16:creationId xmlns="" xmlns:a16="http://schemas.microsoft.com/office/drawing/2014/main" id="{063037B7-2112-2D43-AD2C-8962E1C07583}"/>
-              </a:ext>
-            </a:extLst>
-          </p:cNvPr>
-          <p:cNvSpPr>
-            <a:spLocks noGrp="1"/>
-          </p:cNvSpPr>
-          <p:nvPr>
-            <p:ph idx="1"/>
-          </p:nvPr>
-        </p:nvSpPr>
-        <p:spPr/>
-        <p:txBody>
-          <a:bodyPr/>
-          <a:lstStyle/>
-          <a:p>
-            <a:pPr>
-              <a:buClrTx/>
-            </a:pPr>
-            <a:r>
-              <a:rPr lang="en-US" dirty="0"/>
-              <a:t>Build a new version of the app</a:t>
-            </a:r>
-          </a:p>
-          <a:p>
-            <a:pPr>
-              <a:buClrTx/>
-            </a:pPr>
-            <a:r>
-              <a:rPr lang="en-US" dirty="0"/>
-              <a:t>Set the image</a:t>
-            </a:r>
-          </a:p>
-          <a:p>
-            <a:pPr>
-              <a:buClrTx/>
-            </a:pPr>
-            <a:r>
-              <a:rPr lang="en-US" dirty="0"/>
-              <a:t>Watch </a:t>
-            </a:r>
-            <a:r>
-              <a:rPr lang="en-US" dirty="0" smtClean="0"/>
-              <a:t>the new instance it rollout</a:t>
-            </a:r>
-          </a:p>
-          <a:p>
-            <a:pPr lvl="1"/>
-            <a:r>
-              <a:rPr lang="en-US" dirty="0" smtClean="0"/>
-              <a:t>see </a:t>
-            </a:r>
-            <a:r>
-              <a:rPr lang="en-US" dirty="0"/>
-              <a:t>the values returned change</a:t>
-            </a:r>
-          </a:p>
-          <a:p>
-            <a:pPr>
-              <a:buClrTx/>
-            </a:pPr>
-            <a:endParaRPr lang="en-US" dirty="0"/>
-          </a:p>
-          <a:p>
-            <a:pPr>
-              <a:buClrTx/>
-            </a:pPr>
-            <a:endParaRPr lang="en-US" dirty="0"/>
-          </a:p>
-        </p:txBody>
-      </p:sp>
-      <p:sp>
-        <p:nvSpPr>
-          <p:cNvPr id="4" name="Slide Number Placeholder 3">
-            <a:extLst>
-              <a:ext uri="{FF2B5EF4-FFF2-40B4-BE49-F238E27FC236}">
-                <a16:creationId xmlns="" xmlns:a16="http://schemas.microsoft.com/office/drawing/2014/main" id="{4F225741-B372-2F47-8851-DB884C2FC55E}"/>
-              </a:ext>
-            </a:extLst>
-          </p:cNvPr>
-          <p:cNvSpPr>
-            <a:spLocks noGrp="1"/>
-          </p:cNvSpPr>
-          <p:nvPr>
-            <p:ph type="sldNum" sz="quarter" idx="12"/>
-          </p:nvPr>
-        </p:nvSpPr>
-        <p:spPr/>
-        <p:txBody>
-          <a:bodyPr/>
-          <a:lstStyle/>
-          <a:p>
-            <a:fld id="{D924A81F-5E2C-2E4D-A217-11B91391D3AF}" type="slidenum">
-              <a:rPr lang="en-US" smtClean="0"/>
-              <a:t>27</a:t>
-            </a:fld>
-            <a:endParaRPr lang="en-US"/>
+          <a:bodyPr>
+            <a:normAutofit fontScale="90000"/>
+          </a:bodyPr>
+          <a:lstStyle/>
+          <a:p>
+            <a:r>
+              <a:rPr lang="en-US" dirty="0"/>
+              <a:t>Developer Advocacy</a:t>
+            </a:r>
+            <a:br>
+              <a:rPr lang="en-US" dirty="0"/>
+            </a:br>
+            <a:r>
+              <a:rPr lang="en-US" dirty="0" err="1"/>
+              <a:t>Kube</a:t>
+            </a:r>
+            <a:r>
+              <a:rPr lang="en-US" dirty="0"/>
+              <a:t> 101 - Final Thoughts</a:t>
+            </a:r>
           </a:p>
         </p:txBody>
       </p:sp>
     </p:spTree>
     <p:extLst>
       <p:ext uri="{BB962C8B-B14F-4D97-AF65-F5344CB8AC3E}">
-        <p14:creationId xmlns:p14="http://schemas.microsoft.com/office/powerpoint/2010/main" val="1843249446"/>
+        <p14:creationId xmlns:p14="http://schemas.microsoft.com/office/powerpoint/2010/main" val="718799704"/>
       </p:ext>
     </p:extLst>
   </p:cSld>
@@ -14415,12 +14029,18 @@
       </p:grpSpPr>
       <p:sp>
         <p:nvSpPr>
-          <p:cNvPr id="2" name="Text Placeholder 1"/>
-          <p:cNvSpPr>
-            <a:spLocks noGrp="1"/>
-          </p:cNvSpPr>
-          <p:nvPr>
-            <p:ph type="body" sz="quarter" idx="10"/>
+          <p:cNvPr id="2" name="Title 1">
+            <a:extLst>
+              <a:ext uri="{FF2B5EF4-FFF2-40B4-BE49-F238E27FC236}">
+                <a16:creationId xmlns:a16="http://schemas.microsoft.com/office/drawing/2014/main" id="{2A0FBC5F-3EFB-4EF2-952C-F937AF8333E0}"/>
+              </a:ext>
+            </a:extLst>
+          </p:cNvPr>
+          <p:cNvSpPr>
+            <a:spLocks noGrp="1"/>
+          </p:cNvSpPr>
+          <p:nvPr>
+            <p:ph type="title"/>
           </p:nvPr>
         </p:nvSpPr>
         <p:spPr/>
@@ -14428,58 +14048,144 @@
           <a:bodyPr/>
           <a:lstStyle/>
           <a:p>
-            <a:endParaRPr lang="en-US"/>
-          </a:p>
-          <a:p>
+            <a:r>
+              <a:rPr lang="en-US" dirty="0"/>
+              <a:t>Kubernetes @ IBM</a:t>
+            </a:r>
+          </a:p>
+        </p:txBody>
+      </p:sp>
+      <p:sp>
+        <p:nvSpPr>
+          <p:cNvPr id="3" name="Content Placeholder 2">
+            <a:extLst>
+              <a:ext uri="{FF2B5EF4-FFF2-40B4-BE49-F238E27FC236}">
+                <a16:creationId xmlns:a16="http://schemas.microsoft.com/office/drawing/2014/main" id="{4BA8E388-F52F-4EB5-B662-1F4B577561EB}"/>
+              </a:ext>
+            </a:extLst>
+          </p:cNvPr>
+          <p:cNvSpPr>
+            <a:spLocks noGrp="1"/>
+          </p:cNvSpPr>
+          <p:nvPr>
+            <p:ph idx="1"/>
+          </p:nvPr>
+        </p:nvSpPr>
+        <p:spPr/>
+        <p:txBody>
+          <a:bodyPr vert="horz" lIns="91440" tIns="45720" rIns="91440" bIns="45720" rtlCol="0" anchor="t">
+            <a:normAutofit fontScale="92500" lnSpcReduction="20000"/>
+          </a:bodyPr>
+          <a:lstStyle/>
+          <a:p>
+            <a:r>
+              <a:rPr lang="en-US" dirty="0"/>
+              <a:t>Offerings / Plans</a:t>
+            </a:r>
+          </a:p>
+          <a:p>
+            <a:pPr marL="631190"/>
+            <a:r>
+              <a:rPr lang="en-US" dirty="0"/>
+              <a:t>IBM Cloud Container Services – Docker containers orchestrated by K8s</a:t>
+            </a:r>
+          </a:p>
+          <a:p>
+            <a:pPr marL="631190"/>
+            <a:r>
+              <a:rPr lang="en-US" dirty="0" err="1"/>
+              <a:t>ICp</a:t>
+            </a:r>
+            <a:r>
+              <a:rPr lang="en-US" dirty="0"/>
+              <a:t> – IBM Cloud Private</a:t>
+            </a:r>
+          </a:p>
+          <a:p>
+            <a:pPr marL="631190"/>
+            <a:r>
+              <a:rPr lang="en-US" dirty="0"/>
+              <a:t>Watson is </a:t>
+            </a:r>
+            <a:r>
+              <a:rPr lang="en-US"/>
+              <a:t>using Kubernetes</a:t>
+            </a:r>
+          </a:p>
+          <a:p>
+            <a:pPr marL="631190"/>
             <a:endParaRPr lang="en-US" dirty="0"/>
           </a:p>
           <a:p>
-            <a:r>
-              <a:rPr lang="en-US" dirty="0"/>
-              <a:t>Feb 5 2018</a:t>
-            </a:r>
-          </a:p>
-        </p:txBody>
-      </p:sp>
-      <p:sp>
-        <p:nvSpPr>
-          <p:cNvPr id="3" name="Title 2"/>
-          <p:cNvSpPr>
-            <a:spLocks noGrp="1"/>
-          </p:cNvSpPr>
-          <p:nvPr>
-            <p:ph type="title"/>
-          </p:nvPr>
-        </p:nvSpPr>
-        <p:spPr/>
-        <p:txBody>
-          <a:bodyPr>
-            <a:normAutofit fontScale="90000"/>
-          </a:bodyPr>
-          <a:lstStyle/>
-          <a:p>
-            <a:r>
-              <a:rPr lang="en-US" dirty="0"/>
-              <a:t>Developer Advocacy</a:t>
-            </a:r>
-            <a:br>
-              <a:rPr lang="en-US" dirty="0"/>
-            </a:br>
+            <a:pPr marL="347345"/>
+            <a:r>
+              <a:rPr lang="en-US" dirty="0"/>
+              <a:t>Key Development Activities</a:t>
+            </a:r>
+          </a:p>
+          <a:p>
+            <a:pPr marL="631190"/>
+            <a:r>
+              <a:rPr lang="en-US" dirty="0"/>
+              <a:t>Service Catalog  (co-lead)</a:t>
+            </a:r>
+          </a:p>
+          <a:p>
+            <a:pPr marL="631190"/>
+            <a:r>
+              <a:rPr lang="en-US" dirty="0"/>
+              <a:t>Contributor Experience</a:t>
+            </a:r>
+          </a:p>
+          <a:p>
+            <a:pPr marL="631190"/>
+            <a:r>
+              <a:rPr lang="en-US" dirty="0"/>
+              <a:t>Networking &amp; </a:t>
+            </a:r>
             <a:r>
               <a:rPr lang="en-US" dirty="0" err="1"/>
-              <a:t>Kube</a:t>
-            </a:r>
-            <a:r>
-              <a:rPr lang="en-US" dirty="0"/>
-              <a:t> 101 - Final Thoughts</a:t>
-            </a:r>
+              <a:t>Istio</a:t>
+            </a:r>
+            <a:r>
+              <a:rPr lang="en-US" dirty="0"/>
+              <a:t> (co-lead)</a:t>
+            </a:r>
+          </a:p>
+          <a:p>
+            <a:pPr marL="631190"/>
+            <a:r>
+              <a:rPr lang="en-US" dirty="0" err="1"/>
+              <a:t>ContainerD</a:t>
+            </a:r>
+            <a:r>
+              <a:rPr lang="en-US" dirty="0"/>
+              <a:t> integration (co-lead)</a:t>
+            </a:r>
+          </a:p>
+          <a:p>
+            <a:pPr marL="631190"/>
+            <a:r>
+              <a:rPr lang="en-US" dirty="0"/>
+              <a:t>Storage</a:t>
+            </a:r>
+          </a:p>
+          <a:p>
+            <a:pPr marL="631190"/>
+            <a:r>
+              <a:rPr lang="en-US" dirty="0"/>
+              <a:t>Performance</a:t>
+            </a:r>
+          </a:p>
+          <a:p>
+            <a:endParaRPr lang="en-US" dirty="0"/>
           </a:p>
         </p:txBody>
       </p:sp>
     </p:spTree>
     <p:extLst>
       <p:ext uri="{BB962C8B-B14F-4D97-AF65-F5344CB8AC3E}">
-        <p14:creationId xmlns:p14="http://schemas.microsoft.com/office/powerpoint/2010/main" val="718799704"/>
+        <p14:creationId xmlns:p14="http://schemas.microsoft.com/office/powerpoint/2010/main" val="71658373"/>
       </p:ext>
     </p:extLst>
   </p:cSld>
@@ -14508,13 +14214,7 @@
       </p:grpSpPr>
       <p:sp>
         <p:nvSpPr>
-          <p:cNvPr id="2" name="Title 1">
-            <a:extLst>
-              <a:ext uri="{FF2B5EF4-FFF2-40B4-BE49-F238E27FC236}">
-                <a16:creationId xmlns="" xmlns:a16="http://schemas.microsoft.com/office/drawing/2014/main" id="{2A0FBC5F-3EFB-4EF2-952C-F937AF8333E0}"/>
-              </a:ext>
-            </a:extLst>
-          </p:cNvPr>
+          <p:cNvPr id="2" name="Title 1"/>
           <p:cNvSpPr>
             <a:spLocks noGrp="1"/>
           </p:cNvSpPr>
@@ -14528,21 +14228,16 @@
           <a:lstStyle/>
           <a:p>
             <a:r>
-              <a:rPr lang="en-US" dirty="0"/>
-              <a:t>Kubernetes @ IBM</a:t>
-            </a:r>
-          </a:p>
-        </p:txBody>
-      </p:sp>
-      <p:sp>
-        <p:nvSpPr>
-          <p:cNvPr id="3" name="Content Placeholder 2">
-            <a:extLst>
-              <a:ext uri="{FF2B5EF4-FFF2-40B4-BE49-F238E27FC236}">
-                <a16:creationId xmlns="" xmlns:a16="http://schemas.microsoft.com/office/drawing/2014/main" id="{4BA8E388-F52F-4EB5-B662-1F4B577561EB}"/>
-              </a:ext>
-            </a:extLst>
-          </p:cNvPr>
+              <a:rPr lang="en-US" b="1" dirty="0"/>
+              <a:t>Kubernetes Resources</a:t>
+            </a:r>
+            <a:endParaRPr lang="en-US" dirty="0"/>
+          </a:p>
+        </p:txBody>
+      </p:sp>
+      <p:sp>
+        <p:nvSpPr>
+          <p:cNvPr id="3" name="Content Placeholder 2"/>
           <p:cNvSpPr>
             <a:spLocks noGrp="1"/>
           </p:cNvSpPr>
@@ -14553,118 +14248,127 @@
         <p:spPr/>
         <p:txBody>
           <a:bodyPr vert="horz" lIns="91440" tIns="45720" rIns="91440" bIns="45720" rtlCol="0" anchor="t">
-            <a:normAutofit fontScale="92500" lnSpcReduction="20000"/>
+            <a:normAutofit/>
           </a:bodyPr>
           <a:lstStyle/>
           <a:p>
             <a:r>
               <a:rPr lang="en-US" dirty="0"/>
-              <a:t>Offerings / Plans</a:t>
-            </a:r>
-          </a:p>
-          <a:p>
-            <a:pPr marL="631190"/>
-            <a:r>
-              <a:rPr lang="en-US" dirty="0"/>
-              <a:t>IBM Cloud Container Services – Docker containers orchestrated by K8s</a:t>
-            </a:r>
-          </a:p>
-          <a:p>
-            <a:pPr marL="631190"/>
-            <a:r>
-              <a:rPr lang="en-US" dirty="0" err="1"/>
-              <a:t>ICp</a:t>
-            </a:r>
-            <a:r>
-              <a:rPr lang="en-US" dirty="0"/>
-              <a:t> – IBM Cloud Private</a:t>
-            </a:r>
-          </a:p>
-          <a:p>
-            <a:pPr marL="631190"/>
-            <a:r>
-              <a:rPr lang="en-US" dirty="0"/>
-              <a:t>Watson is </a:t>
-            </a:r>
-            <a:r>
-              <a:rPr lang="en-US"/>
-              <a:t>using Kubernetes</a:t>
-            </a:r>
-          </a:p>
-          <a:p>
-            <a:pPr marL="631190"/>
+              <a:t>Main Website - </a:t>
+            </a:r>
+            <a:r>
+              <a:rPr lang="en-US" b="1" dirty="0"/>
+              <a:t> </a:t>
+            </a:r>
+            <a:r>
+              <a:rPr lang="en-US" u="sng" dirty="0">
+                <a:hlinkClick r:id="rId3"/>
+              </a:rPr>
+              <a:t>http://kubernetes.io</a:t>
+            </a:r>
             <a:endParaRPr lang="en-US" dirty="0"/>
           </a:p>
           <a:p>
-            <a:pPr marL="347345"/>
-            <a:r>
-              <a:rPr lang="en-US" dirty="0"/>
-              <a:t>Key Development Activities</a:t>
-            </a:r>
-          </a:p>
-          <a:p>
-            <a:pPr marL="631190"/>
-            <a:r>
-              <a:rPr lang="en-US" dirty="0"/>
-              <a:t>Service Catalog  (co-lead)</a:t>
-            </a:r>
-          </a:p>
-          <a:p>
-            <a:pPr marL="631190"/>
-            <a:r>
-              <a:rPr lang="en-US" dirty="0"/>
-              <a:t>Contributor Experience</a:t>
-            </a:r>
-          </a:p>
-          <a:p>
-            <a:pPr marL="631190"/>
-            <a:r>
-              <a:rPr lang="en-US" dirty="0"/>
-              <a:t>Networking &amp; </a:t>
-            </a:r>
-            <a:r>
-              <a:rPr lang="en-US" dirty="0" err="1"/>
-              <a:t>Istio</a:t>
-            </a:r>
-            <a:r>
-              <a:rPr lang="en-US" dirty="0"/>
-              <a:t> (co-lead)</a:t>
-            </a:r>
-          </a:p>
-          <a:p>
-            <a:pPr marL="631190"/>
-            <a:r>
-              <a:rPr lang="en-US" dirty="0" err="1"/>
-              <a:t>ContainerD</a:t>
-            </a:r>
-            <a:r>
-              <a:rPr lang="en-US" dirty="0"/>
-              <a:t> integration (co-lead)</a:t>
-            </a:r>
-          </a:p>
-          <a:p>
-            <a:pPr marL="631190"/>
-            <a:r>
-              <a:rPr lang="en-US" dirty="0"/>
-              <a:t>Storage</a:t>
-            </a:r>
-          </a:p>
-          <a:p>
-            <a:pPr marL="631190"/>
-            <a:r>
-              <a:rPr lang="en-US" dirty="0"/>
-              <a:t>Performance</a:t>
-            </a:r>
-          </a:p>
-          <a:p>
+            <a:pPr marL="742950" lvl="1" indent="-285750">
+              <a:buFont typeface="Arial" charset="0"/>
+              <a:buChar char="•"/>
+            </a:pPr>
             <a:endParaRPr lang="en-US" dirty="0"/>
+          </a:p>
+          <a:p>
+            <a:pPr marL="285750" indent="-285750">
+              <a:buFont typeface="Arial" charset="0"/>
+              <a:buChar char="•"/>
+            </a:pPr>
+            <a:r>
+              <a:rPr lang="en-US" dirty="0"/>
+              <a:t>Source Code - </a:t>
+            </a:r>
+            <a:r>
+              <a:rPr lang="en-US" u="sng" dirty="0">
+                <a:hlinkClick r:id="rId4"/>
+              </a:rPr>
+              <a:t>https://github.com/kubernetes</a:t>
+            </a:r>
+            <a:endParaRPr lang="en-US" u="sng" dirty="0"/>
+          </a:p>
+          <a:p>
+            <a:pPr marL="285750" indent="-285750">
+              <a:buFont typeface="Arial" charset="0"/>
+              <a:buChar char="•"/>
+            </a:pPr>
+            <a:endParaRPr lang="en-US" dirty="0"/>
+          </a:p>
+          <a:p>
+            <a:pPr marL="285750" indent="-285750">
+              <a:buFont typeface="Arial" charset="0"/>
+              <a:buChar char="•"/>
+            </a:pPr>
+            <a:r>
+              <a:rPr lang="en-US" u="sng" dirty="0">
+                <a:hlinkClick r:id="rId5"/>
+              </a:rPr>
+              <a:t>Youtube Channel</a:t>
+            </a:r>
+            <a:endParaRPr lang="en-US" u="sng" dirty="0"/>
+          </a:p>
+          <a:p>
+            <a:pPr marL="285750" indent="-285750">
+              <a:buFont typeface="Arial" charset="0"/>
+              <a:buChar char="•"/>
+            </a:pPr>
+            <a:endParaRPr lang="en-US" u="sng" dirty="0"/>
+          </a:p>
+          <a:p>
+            <a:pPr marL="285750" indent="-285750">
+              <a:buFont typeface="Arial" charset="0"/>
+              <a:buChar char="•"/>
+            </a:pPr>
+            <a:r>
+              <a:rPr lang="en-US" dirty="0"/>
+              <a:t>Many </a:t>
+            </a:r>
+            <a:r>
+              <a:rPr lang="en-US" dirty="0">
+                <a:hlinkClick r:id="rId6"/>
+              </a:rPr>
+              <a:t>SIG’s</a:t>
+            </a:r>
+            <a:r>
+              <a:rPr lang="en-US" dirty="0"/>
+              <a:t>(Special Interest Groups), Zoom</a:t>
+            </a:r>
+          </a:p>
+          <a:p>
+            <a:pPr marL="285750" indent="-285750">
+              <a:buFont typeface="Arial" charset="0"/>
+              <a:buChar char="•"/>
+            </a:pPr>
+            <a:endParaRPr lang="en-US" dirty="0"/>
+          </a:p>
+          <a:p>
+            <a:pPr marL="285750" indent="-285750">
+              <a:buFont typeface="Arial" charset="0"/>
+              <a:buChar char="•"/>
+            </a:pPr>
+            <a:r>
+              <a:rPr lang="en-US" dirty="0"/>
+              <a:t>Meetup </a:t>
+            </a:r>
+            <a:r>
+              <a:rPr lang="en-US" b="0" dirty="0">
+                <a:hlinkClick r:id="rId7"/>
+              </a:rPr>
+              <a:t>https://github.com/IBM/container-service-getting-started-wt</a:t>
+            </a:r>
+            <a:endParaRPr lang="en-US" b="0" dirty="0"/>
           </a:p>
         </p:txBody>
       </p:sp>
     </p:spTree>
     <p:extLst>
       <p:ext uri="{BB962C8B-B14F-4D97-AF65-F5344CB8AC3E}">
-        <p14:creationId xmlns:p14="http://schemas.microsoft.com/office/powerpoint/2010/main" val="71658373"/>
+        <p14:creationId xmlns:p14="http://schemas.microsoft.com/office/powerpoint/2010/main" val="22582232"/>
       </p:ext>
     </p:extLst>
   </p:cSld>
@@ -15337,189 +15041,6 @@
       </p:par>
     </p:tnLst>
   </p:timing>
-</p:sld>
-</file>
-
-<file path=ppt/slides/slide30.xml><?xml version="1.0" encoding="utf-8"?>
-<p:sld xmlns:a="http://schemas.openxmlformats.org/drawingml/2006/main" xmlns:r="http://schemas.openxmlformats.org/officeDocument/2006/relationships" xmlns:p="http://schemas.openxmlformats.org/presentationml/2006/main">
-  <p:cSld>
-    <p:spTree>
-      <p:nvGrpSpPr>
-        <p:cNvPr id="1" name=""/>
-        <p:cNvGrpSpPr/>
-        <p:nvPr/>
-      </p:nvGrpSpPr>
-      <p:grpSpPr>
-        <a:xfrm>
-          <a:off x="0" y="0"/>
-          <a:ext cx="0" cy="0"/>
-          <a:chOff x="0" y="0"/>
-          <a:chExt cx="0" cy="0"/>
-        </a:xfrm>
-      </p:grpSpPr>
-      <p:sp>
-        <p:nvSpPr>
-          <p:cNvPr id="2" name="Title 1"/>
-          <p:cNvSpPr>
-            <a:spLocks noGrp="1"/>
-          </p:cNvSpPr>
-          <p:nvPr>
-            <p:ph type="title"/>
-          </p:nvPr>
-        </p:nvSpPr>
-        <p:spPr/>
-        <p:txBody>
-          <a:bodyPr/>
-          <a:lstStyle/>
-          <a:p>
-            <a:r>
-              <a:rPr lang="en-US" b="1" dirty="0"/>
-              <a:t>Kubernetes Resources</a:t>
-            </a:r>
-            <a:endParaRPr lang="en-US" dirty="0"/>
-          </a:p>
-        </p:txBody>
-      </p:sp>
-      <p:sp>
-        <p:nvSpPr>
-          <p:cNvPr id="3" name="Content Placeholder 2"/>
-          <p:cNvSpPr>
-            <a:spLocks noGrp="1"/>
-          </p:cNvSpPr>
-          <p:nvPr>
-            <p:ph idx="1"/>
-          </p:nvPr>
-        </p:nvSpPr>
-        <p:spPr/>
-        <p:txBody>
-          <a:bodyPr vert="horz" lIns="91440" tIns="45720" rIns="91440" bIns="45720" rtlCol="0" anchor="t">
-            <a:normAutofit/>
-          </a:bodyPr>
-          <a:lstStyle/>
-          <a:p>
-            <a:r>
-              <a:rPr lang="en-US" dirty="0"/>
-              <a:t>Main Website - </a:t>
-            </a:r>
-            <a:r>
-              <a:rPr lang="en-US" b="1" dirty="0"/>
-              <a:t> </a:t>
-            </a:r>
-            <a:r>
-              <a:rPr lang="en-US" u="sng" dirty="0">
-                <a:hlinkClick r:id="rId3"/>
-              </a:rPr>
-              <a:t>http://kubernetes.io</a:t>
-            </a:r>
-            <a:endParaRPr lang="en-US" dirty="0"/>
-          </a:p>
-          <a:p>
-            <a:pPr marL="742950" lvl="1" indent="-285750">
-              <a:buFont typeface="Arial" charset="0"/>
-              <a:buChar char="•"/>
-            </a:pPr>
-            <a:endParaRPr lang="en-US" dirty="0"/>
-          </a:p>
-          <a:p>
-            <a:pPr marL="285750" indent="-285750">
-              <a:buFont typeface="Arial" charset="0"/>
-              <a:buChar char="•"/>
-            </a:pPr>
-            <a:r>
-              <a:rPr lang="en-US" dirty="0"/>
-              <a:t>Source Code - </a:t>
-            </a:r>
-            <a:r>
-              <a:rPr lang="en-US" u="sng" dirty="0">
-                <a:hlinkClick r:id="rId4"/>
-              </a:rPr>
-              <a:t>https://github.com/kubernetes</a:t>
-            </a:r>
-            <a:endParaRPr lang="en-US" u="sng" dirty="0"/>
-          </a:p>
-          <a:p>
-            <a:pPr marL="285750" indent="-285750">
-              <a:buFont typeface="Arial" charset="0"/>
-              <a:buChar char="•"/>
-            </a:pPr>
-            <a:endParaRPr lang="en-US" dirty="0"/>
-          </a:p>
-          <a:p>
-            <a:pPr marL="285750" indent="-285750">
-              <a:buFont typeface="Arial" charset="0"/>
-              <a:buChar char="•"/>
-            </a:pPr>
-            <a:r>
-              <a:rPr lang="en-US" u="sng" dirty="0">
-                <a:hlinkClick r:id="rId5"/>
-              </a:rPr>
-              <a:t>Youtube Channel</a:t>
-            </a:r>
-            <a:endParaRPr lang="en-US" u="sng" dirty="0"/>
-          </a:p>
-          <a:p>
-            <a:pPr marL="285750" indent="-285750">
-              <a:buFont typeface="Arial" charset="0"/>
-              <a:buChar char="•"/>
-            </a:pPr>
-            <a:endParaRPr lang="en-US" u="sng" dirty="0"/>
-          </a:p>
-          <a:p>
-            <a:pPr marL="285750" indent="-285750">
-              <a:buFont typeface="Arial" charset="0"/>
-              <a:buChar char="•"/>
-            </a:pPr>
-            <a:r>
-              <a:rPr lang="en-US" dirty="0"/>
-              <a:t>Many </a:t>
-            </a:r>
-            <a:r>
-              <a:rPr lang="en-US" dirty="0">
-                <a:hlinkClick r:id="rId6"/>
-              </a:rPr>
-              <a:t>SIG’s</a:t>
-            </a:r>
-            <a:r>
-              <a:rPr lang="en-US" dirty="0"/>
-              <a:t>(Special Interest Groups), Zoom</a:t>
-            </a:r>
-          </a:p>
-          <a:p>
-            <a:pPr marL="285750" indent="-285750">
-              <a:buFont typeface="Arial" charset="0"/>
-              <a:buChar char="•"/>
-            </a:pPr>
-            <a:endParaRPr lang="en-US" dirty="0"/>
-          </a:p>
-          <a:p>
-            <a:pPr marL="285750" indent="-285750">
-              <a:buFont typeface="Arial" charset="0"/>
-              <a:buChar char="•"/>
-            </a:pPr>
-            <a:r>
-              <a:rPr lang="en-US" dirty="0"/>
-              <a:t>Meetup </a:t>
-            </a:r>
-            <a:r>
-              <a:rPr lang="en-US" b="0" dirty="0">
-                <a:hlinkClick r:id="rId7"/>
-              </a:rPr>
-              <a:t>https://github.com/IBM/container-service-getting-started-wt</a:t>
-            </a:r>
-            <a:endParaRPr lang="en-US" b="0" dirty="0"/>
-          </a:p>
-        </p:txBody>
-      </p:sp>
-    </p:spTree>
-    <p:extLst>
-      <p:ext uri="{BB962C8B-B14F-4D97-AF65-F5344CB8AC3E}">
-        <p14:creationId xmlns:p14="http://schemas.microsoft.com/office/powerpoint/2010/main" val="22582232"/>
-      </p:ext>
-    </p:extLst>
-  </p:cSld>
-  <p:clrMapOvr>
-    <a:masterClrMapping/>
-  </p:clrMapOvr>
 </p:sld>
 </file>
 

</xml_diff>